<commit_message>
Adicionado mais duas apresentações.
</commit_message>
<xml_diff>
--- a/docs/DiagramaCasoDeUso.pptx
+++ b/docs/DiagramaCasoDeUso.pptx
@@ -7,6 +7,8 @@
   <p:sldIdLst>
     <p:sldId id="256" r:id="rId2"/>
     <p:sldId id="257" r:id="rId3"/>
+    <p:sldId id="258" r:id="rId4"/>
+    <p:sldId id="259" r:id="rId5"/>
   </p:sldIdLst>
   <p:sldSz cx="12192000" cy="6858000"/>
   <p:notesSz cx="6858000" cy="9144000"/>
@@ -272,7 +274,7 @@
           <a:p>
             <a:fld id="{C01E3D7C-ADA5-47A3-8E90-C672760382AC}" type="datetimeFigureOut">
               <a:rPr lang="pt-BR" smtClean="0"/>
-              <a:t>28/04/2025</a:t>
+              <a:t>30/04/2025</a:t>
             </a:fld>
             <a:endParaRPr lang="pt-BR"/>
           </a:p>
@@ -470,7 +472,7 @@
           <a:p>
             <a:fld id="{C01E3D7C-ADA5-47A3-8E90-C672760382AC}" type="datetimeFigureOut">
               <a:rPr lang="pt-BR" smtClean="0"/>
-              <a:t>28/04/2025</a:t>
+              <a:t>30/04/2025</a:t>
             </a:fld>
             <a:endParaRPr lang="pt-BR"/>
           </a:p>
@@ -678,7 +680,7 @@
           <a:p>
             <a:fld id="{C01E3D7C-ADA5-47A3-8E90-C672760382AC}" type="datetimeFigureOut">
               <a:rPr lang="pt-BR" smtClean="0"/>
-              <a:t>28/04/2025</a:t>
+              <a:t>30/04/2025</a:t>
             </a:fld>
             <a:endParaRPr lang="pt-BR"/>
           </a:p>
@@ -876,7 +878,7 @@
           <a:p>
             <a:fld id="{C01E3D7C-ADA5-47A3-8E90-C672760382AC}" type="datetimeFigureOut">
               <a:rPr lang="pt-BR" smtClean="0"/>
-              <a:t>28/04/2025</a:t>
+              <a:t>30/04/2025</a:t>
             </a:fld>
             <a:endParaRPr lang="pt-BR"/>
           </a:p>
@@ -1151,7 +1153,7 @@
           <a:p>
             <a:fld id="{C01E3D7C-ADA5-47A3-8E90-C672760382AC}" type="datetimeFigureOut">
               <a:rPr lang="pt-BR" smtClean="0"/>
-              <a:t>28/04/2025</a:t>
+              <a:t>30/04/2025</a:t>
             </a:fld>
             <a:endParaRPr lang="pt-BR"/>
           </a:p>
@@ -1416,7 +1418,7 @@
           <a:p>
             <a:fld id="{C01E3D7C-ADA5-47A3-8E90-C672760382AC}" type="datetimeFigureOut">
               <a:rPr lang="pt-BR" smtClean="0"/>
-              <a:t>28/04/2025</a:t>
+              <a:t>30/04/2025</a:t>
             </a:fld>
             <a:endParaRPr lang="pt-BR"/>
           </a:p>
@@ -1828,7 +1830,7 @@
           <a:p>
             <a:fld id="{C01E3D7C-ADA5-47A3-8E90-C672760382AC}" type="datetimeFigureOut">
               <a:rPr lang="pt-BR" smtClean="0"/>
-              <a:t>28/04/2025</a:t>
+              <a:t>30/04/2025</a:t>
             </a:fld>
             <a:endParaRPr lang="pt-BR"/>
           </a:p>
@@ -1969,7 +1971,7 @@
           <a:p>
             <a:fld id="{C01E3D7C-ADA5-47A3-8E90-C672760382AC}" type="datetimeFigureOut">
               <a:rPr lang="pt-BR" smtClean="0"/>
-              <a:t>28/04/2025</a:t>
+              <a:t>30/04/2025</a:t>
             </a:fld>
             <a:endParaRPr lang="pt-BR"/>
           </a:p>
@@ -2082,7 +2084,7 @@
           <a:p>
             <a:fld id="{C01E3D7C-ADA5-47A3-8E90-C672760382AC}" type="datetimeFigureOut">
               <a:rPr lang="pt-BR" smtClean="0"/>
-              <a:t>28/04/2025</a:t>
+              <a:t>30/04/2025</a:t>
             </a:fld>
             <a:endParaRPr lang="pt-BR"/>
           </a:p>
@@ -2393,7 +2395,7 @@
           <a:p>
             <a:fld id="{C01E3D7C-ADA5-47A3-8E90-C672760382AC}" type="datetimeFigureOut">
               <a:rPr lang="pt-BR" smtClean="0"/>
-              <a:t>28/04/2025</a:t>
+              <a:t>30/04/2025</a:t>
             </a:fld>
             <a:endParaRPr lang="pt-BR"/>
           </a:p>
@@ -2681,7 +2683,7 @@
           <a:p>
             <a:fld id="{C01E3D7C-ADA5-47A3-8E90-C672760382AC}" type="datetimeFigureOut">
               <a:rPr lang="pt-BR" smtClean="0"/>
-              <a:t>28/04/2025</a:t>
+              <a:t>30/04/2025</a:t>
             </a:fld>
             <a:endParaRPr lang="pt-BR"/>
           </a:p>
@@ -2922,7 +2924,7 @@
           <a:p>
             <a:fld id="{C01E3D7C-ADA5-47A3-8E90-C672760382AC}" type="datetimeFigureOut">
               <a:rPr lang="pt-BR" smtClean="0"/>
-              <a:t>28/04/2025</a:t>
+              <a:t>30/04/2025</a:t>
             </a:fld>
             <a:endParaRPr lang="pt-BR"/>
           </a:p>
@@ -5162,12 +5164,255 @@
           </a:extLst>
         </p:spPr>
       </p:pic>
+      <p:sp>
+        <p:nvSpPr>
+          <p:cNvPr id="2" name="CaixaDeTexto 1">
+            <a:extLst>
+              <a:ext uri="{FF2B5EF4-FFF2-40B4-BE49-F238E27FC236}">
+                <a16:creationId xmlns:a16="http://schemas.microsoft.com/office/drawing/2014/main" id="{3A22F102-D4B0-413A-89E8-876635D5F1CD}"/>
+              </a:ext>
+            </a:extLst>
+          </p:cNvPr>
+          <p:cNvSpPr txBox="1"/>
+          <p:nvPr/>
+        </p:nvSpPr>
+        <p:spPr>
+          <a:xfrm>
+            <a:off x="47502" y="281818"/>
+            <a:ext cx="3213100" cy="369332"/>
+          </a:xfrm>
+          <a:prstGeom prst="rect">
+            <a:avLst/>
+          </a:prstGeom>
+          <a:noFill/>
+        </p:spPr>
+        <p:txBody>
+          <a:bodyPr wrap="square" rtlCol="0">
+            <a:spAutoFit/>
+          </a:bodyPr>
+          <a:lstStyle/>
+          <a:p>
+            <a:pPr marL="285750" indent="-285750">
+              <a:buFont typeface="Wingdings" panose="05000000000000000000" pitchFamily="2" charset="2"/>
+              <a:buChar char="Ø"/>
+            </a:pPr>
+            <a:r>
+              <a:rPr lang="pt-BR" dirty="0"/>
+              <a:t>Pesquisa Personalizada</a:t>
+            </a:r>
+          </a:p>
+        </p:txBody>
+      </p:sp>
+      <p:sp>
+        <p:nvSpPr>
+          <p:cNvPr id="12" name="Elipse 11">
+            <a:extLst>
+              <a:ext uri="{FF2B5EF4-FFF2-40B4-BE49-F238E27FC236}">
+                <a16:creationId xmlns:a16="http://schemas.microsoft.com/office/drawing/2014/main" id="{1F021A23-7868-4FDC-A332-F92FF1DAA4D1}"/>
+              </a:ext>
+            </a:extLst>
+          </p:cNvPr>
+          <p:cNvSpPr/>
+          <p:nvPr/>
+        </p:nvSpPr>
+        <p:spPr>
+          <a:xfrm>
+            <a:off x="4233644" y="4946977"/>
+            <a:ext cx="1862356" cy="838899"/>
+          </a:xfrm>
+          <a:prstGeom prst="ellipse">
+            <a:avLst/>
+          </a:prstGeom>
+        </p:spPr>
+        <p:style>
+          <a:lnRef idx="2">
+            <a:schemeClr val="accent1">
+              <a:shade val="50000"/>
+            </a:schemeClr>
+          </a:lnRef>
+          <a:fillRef idx="1">
+            <a:schemeClr val="accent1"/>
+          </a:fillRef>
+          <a:effectRef idx="0">
+            <a:schemeClr val="accent1"/>
+          </a:effectRef>
+          <a:fontRef idx="minor">
+            <a:schemeClr val="lt1"/>
+          </a:fontRef>
+        </p:style>
+        <p:txBody>
+          <a:bodyPr rtlCol="0" anchor="ctr"/>
+          <a:lstStyle/>
+          <a:p>
+            <a:pPr algn="ctr"/>
+            <a:r>
+              <a:rPr lang="pt-BR" dirty="0"/>
+              <a:t>Pesquisar Ocorrência</a:t>
+            </a:r>
+          </a:p>
+        </p:txBody>
+      </p:sp>
+      <p:sp>
+        <p:nvSpPr>
+          <p:cNvPr id="3" name="CaixaDeTexto 2">
+            <a:extLst>
+              <a:ext uri="{FF2B5EF4-FFF2-40B4-BE49-F238E27FC236}">
+                <a16:creationId xmlns:a16="http://schemas.microsoft.com/office/drawing/2014/main" id="{187ADF55-68FD-46B4-A8E5-A94291EB6965}"/>
+              </a:ext>
+            </a:extLst>
+          </p:cNvPr>
+          <p:cNvSpPr txBox="1"/>
+          <p:nvPr/>
+        </p:nvSpPr>
+        <p:spPr>
+          <a:xfrm>
+            <a:off x="1503154" y="1993057"/>
+            <a:ext cx="909223" cy="369332"/>
+          </a:xfrm>
+          <a:prstGeom prst="rect">
+            <a:avLst/>
+          </a:prstGeom>
+          <a:noFill/>
+        </p:spPr>
+        <p:txBody>
+          <a:bodyPr wrap="none" rtlCol="0">
+            <a:spAutoFit/>
+          </a:bodyPr>
+          <a:lstStyle/>
+          <a:p>
+            <a:r>
+              <a:rPr lang="pt-BR" dirty="0"/>
+              <a:t>Usuário</a:t>
+            </a:r>
+          </a:p>
+        </p:txBody>
+      </p:sp>
+      <p:sp>
+        <p:nvSpPr>
+          <p:cNvPr id="13" name="CaixaDeTexto 12">
+            <a:extLst>
+              <a:ext uri="{FF2B5EF4-FFF2-40B4-BE49-F238E27FC236}">
+                <a16:creationId xmlns:a16="http://schemas.microsoft.com/office/drawing/2014/main" id="{E1ED3D7C-E80C-4534-A97E-7A0A6B680469}"/>
+              </a:ext>
+            </a:extLst>
+          </p:cNvPr>
+          <p:cNvSpPr txBox="1"/>
+          <p:nvPr/>
+        </p:nvSpPr>
+        <p:spPr>
+          <a:xfrm>
+            <a:off x="1505119" y="4946977"/>
+            <a:ext cx="798617" cy="369332"/>
+          </a:xfrm>
+          <a:prstGeom prst="rect">
+            <a:avLst/>
+          </a:prstGeom>
+          <a:noFill/>
+        </p:spPr>
+        <p:txBody>
+          <a:bodyPr wrap="none" rtlCol="0">
+            <a:spAutoFit/>
+          </a:bodyPr>
+          <a:lstStyle/>
+          <a:p>
+            <a:r>
+              <a:rPr lang="pt-BR" dirty="0"/>
+              <a:t>Admin</a:t>
+            </a:r>
+          </a:p>
+        </p:txBody>
+      </p:sp>
+      <p:cxnSp>
+        <p:nvCxnSpPr>
+          <p:cNvPr id="16" name="Conector de Seta Reta 15">
+            <a:extLst>
+              <a:ext uri="{FF2B5EF4-FFF2-40B4-BE49-F238E27FC236}">
+                <a16:creationId xmlns:a16="http://schemas.microsoft.com/office/drawing/2014/main" id="{4A722B05-C2C8-49FF-AA4F-43DBA8088A08}"/>
+              </a:ext>
+            </a:extLst>
+          </p:cNvPr>
+          <p:cNvCxnSpPr>
+            <a:cxnSpLocks/>
+            <a:stCxn id="4" idx="3"/>
+            <a:endCxn id="5" idx="2"/>
+          </p:cNvCxnSpPr>
+          <p:nvPr/>
+        </p:nvCxnSpPr>
+        <p:spPr>
+          <a:xfrm flipV="1">
+            <a:off x="2261481" y="1406029"/>
+            <a:ext cx="1972163" cy="2978469"/>
+          </a:xfrm>
+          <a:prstGeom prst="straightConnector1">
+            <a:avLst/>
+          </a:prstGeom>
+          <a:ln>
+            <a:tailEnd type="triangle"/>
+          </a:ln>
+        </p:spPr>
+        <p:style>
+          <a:lnRef idx="1">
+            <a:schemeClr val="accent1"/>
+          </a:lnRef>
+          <a:fillRef idx="0">
+            <a:schemeClr val="accent1"/>
+          </a:fillRef>
+          <a:effectRef idx="0">
+            <a:schemeClr val="accent1"/>
+          </a:effectRef>
+          <a:fontRef idx="minor">
+            <a:schemeClr val="tx1"/>
+          </a:fontRef>
+        </p:style>
+      </p:cxnSp>
+      <p:cxnSp>
+        <p:nvCxnSpPr>
+          <p:cNvPr id="19" name="Conector de Seta Reta 18">
+            <a:extLst>
+              <a:ext uri="{FF2B5EF4-FFF2-40B4-BE49-F238E27FC236}">
+                <a16:creationId xmlns:a16="http://schemas.microsoft.com/office/drawing/2014/main" id="{0AC945D9-3732-4776-BEE8-FFF3870B64AB}"/>
+              </a:ext>
+            </a:extLst>
+          </p:cNvPr>
+          <p:cNvCxnSpPr>
+            <a:cxnSpLocks/>
+            <a:stCxn id="4" idx="3"/>
+          </p:cNvCxnSpPr>
+          <p:nvPr/>
+        </p:nvCxnSpPr>
+        <p:spPr>
+          <a:xfrm flipV="1">
+            <a:off x="2261481" y="2711970"/>
+            <a:ext cx="1985202" cy="1672528"/>
+          </a:xfrm>
+          <a:prstGeom prst="straightConnector1">
+            <a:avLst/>
+          </a:prstGeom>
+          <a:ln>
+            <a:tailEnd type="triangle"/>
+          </a:ln>
+        </p:spPr>
+        <p:style>
+          <a:lnRef idx="1">
+            <a:schemeClr val="accent1"/>
+          </a:lnRef>
+          <a:fillRef idx="0">
+            <a:schemeClr val="accent1"/>
+          </a:fillRef>
+          <a:effectRef idx="0">
+            <a:schemeClr val="accent1"/>
+          </a:effectRef>
+          <a:fontRef idx="minor">
+            <a:schemeClr val="tx1"/>
+          </a:fontRef>
+        </p:style>
+      </p:cxnSp>
       <p:pic>
         <p:nvPicPr>
-          <p:cNvPr id="9" name="Picture 2" descr="Stick figure - Wikipedia">
-            <a:extLst>
-              <a:ext uri="{FF2B5EF4-FFF2-40B4-BE49-F238E27FC236}">
-                <a16:creationId xmlns:a16="http://schemas.microsoft.com/office/drawing/2014/main" id="{A348D4B8-DA86-44C5-9997-36D2AB3ED44B}"/>
+          <p:cNvPr id="22" name="Picture 2" descr="Stick figure - Wikipedia">
+            <a:extLst>
+              <a:ext uri="{FF2B5EF4-FFF2-40B4-BE49-F238E27FC236}">
+                <a16:creationId xmlns:a16="http://schemas.microsoft.com/office/drawing/2014/main" id="{B628B5A1-B3E6-4943-A8A0-E850E910B536}"/>
               </a:ext>
             </a:extLst>
           </p:cNvPr>
@@ -5191,7 +5436,7 @@
         </p:blipFill>
         <p:spPr bwMode="auto">
           <a:xfrm>
-            <a:off x="10297822" y="868099"/>
+            <a:off x="1681397" y="927434"/>
             <a:ext cx="607429" cy="1124958"/>
           </a:xfrm>
           <a:prstGeom prst="rect">
@@ -5209,12 +5454,214 @@
           </a:extLst>
         </p:spPr>
       </p:pic>
+      <p:cxnSp>
+        <p:nvCxnSpPr>
+          <p:cNvPr id="23" name="Conector de Seta Reta 22">
+            <a:extLst>
+              <a:ext uri="{FF2B5EF4-FFF2-40B4-BE49-F238E27FC236}">
+                <a16:creationId xmlns:a16="http://schemas.microsoft.com/office/drawing/2014/main" id="{87B34B41-B701-475D-9D81-23680E3035BF}"/>
+              </a:ext>
+            </a:extLst>
+          </p:cNvPr>
+          <p:cNvCxnSpPr>
+            <a:cxnSpLocks/>
+            <a:stCxn id="22" idx="3"/>
+            <a:endCxn id="7" idx="2"/>
+          </p:cNvCxnSpPr>
+          <p:nvPr/>
+        </p:nvCxnSpPr>
+        <p:spPr>
+          <a:xfrm>
+            <a:off x="2288826" y="1489913"/>
+            <a:ext cx="1944818" cy="2501566"/>
+          </a:xfrm>
+          <a:prstGeom prst="straightConnector1">
+            <a:avLst/>
+          </a:prstGeom>
+          <a:ln>
+            <a:tailEnd type="triangle"/>
+          </a:ln>
+        </p:spPr>
+        <p:style>
+          <a:lnRef idx="1">
+            <a:schemeClr val="accent1"/>
+          </a:lnRef>
+          <a:fillRef idx="0">
+            <a:schemeClr val="accent1"/>
+          </a:fillRef>
+          <a:effectRef idx="0">
+            <a:schemeClr val="accent1"/>
+          </a:effectRef>
+          <a:fontRef idx="minor">
+            <a:schemeClr val="tx1"/>
+          </a:fontRef>
+        </p:style>
+      </p:cxnSp>
+      <p:cxnSp>
+        <p:nvCxnSpPr>
+          <p:cNvPr id="26" name="Conector de Seta Reta 25">
+            <a:extLst>
+              <a:ext uri="{FF2B5EF4-FFF2-40B4-BE49-F238E27FC236}">
+                <a16:creationId xmlns:a16="http://schemas.microsoft.com/office/drawing/2014/main" id="{ACE9330B-A43C-45E0-B168-6E34FCA6867F}"/>
+              </a:ext>
+            </a:extLst>
+          </p:cNvPr>
+          <p:cNvCxnSpPr>
+            <a:cxnSpLocks/>
+            <a:stCxn id="22" idx="3"/>
+            <a:endCxn id="12" idx="2"/>
+          </p:cNvCxnSpPr>
+          <p:nvPr/>
+        </p:nvCxnSpPr>
+        <p:spPr>
+          <a:xfrm>
+            <a:off x="2288826" y="1489913"/>
+            <a:ext cx="1944818" cy="3876514"/>
+          </a:xfrm>
+          <a:prstGeom prst="straightConnector1">
+            <a:avLst/>
+          </a:prstGeom>
+          <a:ln>
+            <a:tailEnd type="triangle"/>
+          </a:ln>
+        </p:spPr>
+        <p:style>
+          <a:lnRef idx="1">
+            <a:schemeClr val="accent1"/>
+          </a:lnRef>
+          <a:fillRef idx="0">
+            <a:schemeClr val="accent1"/>
+          </a:fillRef>
+          <a:effectRef idx="0">
+            <a:schemeClr val="accent1"/>
+          </a:effectRef>
+          <a:fontRef idx="minor">
+            <a:schemeClr val="tx1"/>
+          </a:fontRef>
+        </p:style>
+      </p:cxnSp>
+      <p:cxnSp>
+        <p:nvCxnSpPr>
+          <p:cNvPr id="20" name="Conector de Seta Reta 19">
+            <a:extLst>
+              <a:ext uri="{FF2B5EF4-FFF2-40B4-BE49-F238E27FC236}">
+                <a16:creationId xmlns:a16="http://schemas.microsoft.com/office/drawing/2014/main" id="{98AB76C8-F2B0-49D3-B253-311939063EA3}"/>
+              </a:ext>
+            </a:extLst>
+          </p:cNvPr>
+          <p:cNvCxnSpPr>
+            <a:cxnSpLocks/>
+            <a:stCxn id="4" idx="3"/>
+            <a:endCxn id="7" idx="2"/>
+          </p:cNvCxnSpPr>
+          <p:nvPr/>
+        </p:nvCxnSpPr>
+        <p:spPr>
+          <a:xfrm flipV="1">
+            <a:off x="2261481" y="3991479"/>
+            <a:ext cx="1972163" cy="393019"/>
+          </a:xfrm>
+          <a:prstGeom prst="straightConnector1">
+            <a:avLst/>
+          </a:prstGeom>
+          <a:ln>
+            <a:tailEnd type="triangle"/>
+          </a:ln>
+        </p:spPr>
+        <p:style>
+          <a:lnRef idx="1">
+            <a:schemeClr val="accent1"/>
+          </a:lnRef>
+          <a:fillRef idx="0">
+            <a:schemeClr val="accent1"/>
+          </a:fillRef>
+          <a:effectRef idx="0">
+            <a:schemeClr val="accent1"/>
+          </a:effectRef>
+          <a:fontRef idx="minor">
+            <a:schemeClr val="tx1"/>
+          </a:fontRef>
+        </p:style>
+      </p:cxnSp>
+      <p:cxnSp>
+        <p:nvCxnSpPr>
+          <p:cNvPr id="24" name="Conector de Seta Reta 23">
+            <a:extLst>
+              <a:ext uri="{FF2B5EF4-FFF2-40B4-BE49-F238E27FC236}">
+                <a16:creationId xmlns:a16="http://schemas.microsoft.com/office/drawing/2014/main" id="{2B9F71FF-E568-4418-89D3-554DB0D26C2D}"/>
+              </a:ext>
+            </a:extLst>
+          </p:cNvPr>
+          <p:cNvCxnSpPr>
+            <a:cxnSpLocks/>
+            <a:stCxn id="4" idx="3"/>
+            <a:endCxn id="12" idx="2"/>
+          </p:cNvCxnSpPr>
+          <p:nvPr/>
+        </p:nvCxnSpPr>
+        <p:spPr>
+          <a:xfrm>
+            <a:off x="2261481" y="4384498"/>
+            <a:ext cx="1972163" cy="981929"/>
+          </a:xfrm>
+          <a:prstGeom prst="straightConnector1">
+            <a:avLst/>
+          </a:prstGeom>
+          <a:ln>
+            <a:tailEnd type="triangle"/>
+          </a:ln>
+        </p:spPr>
+        <p:style>
+          <a:lnRef idx="1">
+            <a:schemeClr val="accent1"/>
+          </a:lnRef>
+          <a:fillRef idx="0">
+            <a:schemeClr val="accent1"/>
+          </a:fillRef>
+          <a:effectRef idx="0">
+            <a:schemeClr val="accent1"/>
+          </a:effectRef>
+          <a:fontRef idx="minor">
+            <a:schemeClr val="tx1"/>
+          </a:fontRef>
+        </p:style>
+      </p:cxnSp>
+    </p:spTree>
+    <p:extLst>
+      <p:ext uri="{BB962C8B-B14F-4D97-AF65-F5344CB8AC3E}">
+        <p14:creationId xmlns:p14="http://schemas.microsoft.com/office/powerpoint/2010/main" val="2302770851"/>
+      </p:ext>
+    </p:extLst>
+  </p:cSld>
+  <p:clrMapOvr>
+    <a:masterClrMapping/>
+  </p:clrMapOvr>
+</p:sld>
+</file>
+
+<file path=ppt/slides/slide3.xml><?xml version="1.0" encoding="utf-8"?>
+<p:sld xmlns:a="http://schemas.openxmlformats.org/drawingml/2006/main" xmlns:r="http://schemas.openxmlformats.org/officeDocument/2006/relationships" xmlns:p="http://schemas.openxmlformats.org/presentationml/2006/main">
+  <p:cSld>
+    <p:spTree>
+      <p:nvGrpSpPr>
+        <p:cNvPr id="1" name=""/>
+        <p:cNvGrpSpPr/>
+        <p:nvPr/>
+      </p:nvGrpSpPr>
+      <p:grpSpPr>
+        <a:xfrm>
+          <a:off x="0" y="0"/>
+          <a:ext cx="0" cy="0"/>
+          <a:chOff x="0" y="0"/>
+          <a:chExt cx="0" cy="0"/>
+        </a:xfrm>
+      </p:grpSpPr>
       <p:pic>
         <p:nvPicPr>
-          <p:cNvPr id="10" name="Picture 2" descr="Stick figure - Wikipedia">
-            <a:extLst>
-              <a:ext uri="{FF2B5EF4-FFF2-40B4-BE49-F238E27FC236}">
-                <a16:creationId xmlns:a16="http://schemas.microsoft.com/office/drawing/2014/main" id="{0AC1BA01-CC2B-4302-AD82-3EB7C70380DE}"/>
+          <p:cNvPr id="6" name="Picture 2" descr="Stick figure - Wikipedia">
+            <a:extLst>
+              <a:ext uri="{FF2B5EF4-FFF2-40B4-BE49-F238E27FC236}">
+                <a16:creationId xmlns:a16="http://schemas.microsoft.com/office/drawing/2014/main" id="{68F41A1E-73E2-469E-8680-734DB7D6677D}"/>
               </a:ext>
             </a:extLst>
           </p:cNvPr>
@@ -5238,7 +5685,7 @@
         </p:blipFill>
         <p:spPr bwMode="auto">
           <a:xfrm>
-            <a:off x="10905251" y="4753830"/>
+            <a:off x="319240" y="1266321"/>
             <a:ext cx="607429" cy="1124958"/>
           </a:xfrm>
           <a:prstGeom prst="rect">
@@ -5258,49 +5705,10 @@
       </p:pic>
       <p:sp>
         <p:nvSpPr>
-          <p:cNvPr id="2" name="CaixaDeTexto 1">
-            <a:extLst>
-              <a:ext uri="{FF2B5EF4-FFF2-40B4-BE49-F238E27FC236}">
-                <a16:creationId xmlns:a16="http://schemas.microsoft.com/office/drawing/2014/main" id="{3A22F102-D4B0-413A-89E8-876635D5F1CD}"/>
-              </a:ext>
-            </a:extLst>
-          </p:cNvPr>
-          <p:cNvSpPr txBox="1"/>
-          <p:nvPr/>
-        </p:nvSpPr>
-        <p:spPr>
-          <a:xfrm>
-            <a:off x="47502" y="281818"/>
-            <a:ext cx="3213100" cy="369332"/>
-          </a:xfrm>
-          <a:prstGeom prst="rect">
-            <a:avLst/>
-          </a:prstGeom>
-          <a:noFill/>
-        </p:spPr>
-        <p:txBody>
-          <a:bodyPr wrap="square" rtlCol="0">
-            <a:spAutoFit/>
-          </a:bodyPr>
-          <a:lstStyle/>
-          <a:p>
-            <a:pPr marL="285750" indent="-285750">
-              <a:buFont typeface="Wingdings" panose="05000000000000000000" pitchFamily="2" charset="2"/>
-              <a:buChar char="Ø"/>
-            </a:pPr>
-            <a:r>
-              <a:rPr lang="pt-BR" dirty="0"/>
-              <a:t>Pesquisa Personalizada</a:t>
-            </a:r>
-          </a:p>
-        </p:txBody>
-      </p:sp>
-      <p:sp>
-        <p:nvSpPr>
-          <p:cNvPr id="12" name="Elipse 11">
-            <a:extLst>
-              <a:ext uri="{FF2B5EF4-FFF2-40B4-BE49-F238E27FC236}">
-                <a16:creationId xmlns:a16="http://schemas.microsoft.com/office/drawing/2014/main" id="{1F021A23-7868-4FDC-A332-F92FF1DAA4D1}"/>
+          <p:cNvPr id="8" name="Elipse 7">
+            <a:extLst>
+              <a:ext uri="{FF2B5EF4-FFF2-40B4-BE49-F238E27FC236}">
+                <a16:creationId xmlns:a16="http://schemas.microsoft.com/office/drawing/2014/main" id="{AA8CFEF0-257B-4C99-AFDB-74BD3BD62537}"/>
               </a:ext>
             </a:extLst>
           </p:cNvPr>
@@ -5309,8 +5717,8 @@
         </p:nvSpPr>
         <p:spPr>
           <a:xfrm>
-            <a:off x="4233644" y="4946977"/>
-            <a:ext cx="1862356" cy="838899"/>
+            <a:off x="2387600" y="610450"/>
+            <a:ext cx="2044700" cy="912024"/>
           </a:xfrm>
           <a:prstGeom prst="ellipse">
             <a:avLst/>
@@ -5339,17 +5747,24 @@
             <a:pPr algn="ctr"/>
             <a:r>
               <a:rPr lang="pt-BR" dirty="0"/>
-              <a:t>Pesquisar Ocorrência</a:t>
-            </a:r>
-          </a:p>
-        </p:txBody>
-      </p:sp>
-      <p:sp>
-        <p:nvSpPr>
-          <p:cNvPr id="3" name="CaixaDeTexto 2">
-            <a:extLst>
-              <a:ext uri="{FF2B5EF4-FFF2-40B4-BE49-F238E27FC236}">
-                <a16:creationId xmlns:a16="http://schemas.microsoft.com/office/drawing/2014/main" id="{187ADF55-68FD-46B4-A8E5-A94291EB6965}"/>
+              <a:t>Gerar Visões gerais </a:t>
+            </a:r>
+          </a:p>
+          <a:p>
+            <a:pPr algn="ctr"/>
+            <a:r>
+              <a:rPr lang="pt-BR" dirty="0"/>
+              <a:t>Equipamento</a:t>
+            </a:r>
+          </a:p>
+        </p:txBody>
+      </p:sp>
+      <p:sp>
+        <p:nvSpPr>
+          <p:cNvPr id="9" name="CaixaDeTexto 8">
+            <a:extLst>
+              <a:ext uri="{FF2B5EF4-FFF2-40B4-BE49-F238E27FC236}">
+                <a16:creationId xmlns:a16="http://schemas.microsoft.com/office/drawing/2014/main" id="{D9A29880-3B95-4734-91F3-66A89254B0E4}"/>
               </a:ext>
             </a:extLst>
           </p:cNvPr>
@@ -5358,8 +5773,8 @@
         </p:nvSpPr>
         <p:spPr>
           <a:xfrm>
-            <a:off x="1503154" y="1993057"/>
-            <a:ext cx="909223" cy="369332"/>
+            <a:off x="15526" y="241118"/>
+            <a:ext cx="1717201" cy="369332"/>
           </a:xfrm>
           <a:prstGeom prst="rect">
             <a:avLst/>
@@ -5372,19 +5787,23 @@
           </a:bodyPr>
           <a:lstStyle/>
           <a:p>
+            <a:pPr marL="285750" indent="-285750">
+              <a:buFont typeface="Wingdings" panose="05000000000000000000" pitchFamily="2" charset="2"/>
+              <a:buChar char="Ø"/>
+            </a:pPr>
             <a:r>
               <a:rPr lang="pt-BR" dirty="0"/>
-              <a:t>Usuário</a:t>
-            </a:r>
-          </a:p>
-        </p:txBody>
-      </p:sp>
-      <p:sp>
-        <p:nvSpPr>
-          <p:cNvPr id="13" name="CaixaDeTexto 12">
-            <a:extLst>
-              <a:ext uri="{FF2B5EF4-FFF2-40B4-BE49-F238E27FC236}">
-                <a16:creationId xmlns:a16="http://schemas.microsoft.com/office/drawing/2014/main" id="{E1ED3D7C-E80C-4534-A97E-7A0A6B680469}"/>
+              <a:t>Visões Gerais</a:t>
+            </a:r>
+          </a:p>
+        </p:txBody>
+      </p:sp>
+      <p:sp>
+        <p:nvSpPr>
+          <p:cNvPr id="10" name="CaixaDeTexto 9">
+            <a:extLst>
+              <a:ext uri="{FF2B5EF4-FFF2-40B4-BE49-F238E27FC236}">
+                <a16:creationId xmlns:a16="http://schemas.microsoft.com/office/drawing/2014/main" id="{EF5FCD1C-44EF-43C6-BD91-125CD438D4B7}"/>
               </a:ext>
             </a:extLst>
           </p:cNvPr>
@@ -5393,8 +5812,8 @@
         </p:nvSpPr>
         <p:spPr>
           <a:xfrm>
-            <a:off x="1505119" y="4946977"/>
-            <a:ext cx="798617" cy="369332"/>
+            <a:off x="199675" y="2307426"/>
+            <a:ext cx="968535" cy="646331"/>
           </a:xfrm>
           <a:prstGeom prst="rect">
             <a:avLst/>
@@ -5409,66 +5828,37 @@
           <a:p>
             <a:r>
               <a:rPr lang="pt-BR" dirty="0"/>
-              <a:t>Admin</a:t>
-            </a:r>
-          </a:p>
-        </p:txBody>
-      </p:sp>
-      <p:sp>
-        <p:nvSpPr>
-          <p:cNvPr id="14" name="CaixaDeTexto 13">
-            <a:extLst>
-              <a:ext uri="{FF2B5EF4-FFF2-40B4-BE49-F238E27FC236}">
-                <a16:creationId xmlns:a16="http://schemas.microsoft.com/office/drawing/2014/main" id="{3D030D34-1904-44A5-903C-8D5511FA700B}"/>
-              </a:ext>
-            </a:extLst>
-          </p:cNvPr>
-          <p:cNvSpPr txBox="1"/>
-          <p:nvPr/>
-        </p:nvSpPr>
-        <p:spPr>
-          <a:xfrm>
-            <a:off x="10146923" y="2100184"/>
-            <a:ext cx="909223" cy="369332"/>
-          </a:xfrm>
-          <a:prstGeom prst="rect">
-            <a:avLst/>
-          </a:prstGeom>
-          <a:noFill/>
-        </p:spPr>
-        <p:txBody>
-          <a:bodyPr wrap="none" rtlCol="0">
-            <a:spAutoFit/>
-          </a:bodyPr>
-          <a:lstStyle/>
+              <a:t>Modelo </a:t>
+            </a:r>
+          </a:p>
           <a:p>
             <a:r>
               <a:rPr lang="pt-BR" dirty="0"/>
-              <a:t>Usuário</a:t>
+              <a:t>     IA</a:t>
             </a:r>
           </a:p>
         </p:txBody>
       </p:sp>
       <p:cxnSp>
         <p:nvCxnSpPr>
-          <p:cNvPr id="16" name="Conector de Seta Reta 15">
-            <a:extLst>
-              <a:ext uri="{FF2B5EF4-FFF2-40B4-BE49-F238E27FC236}">
-                <a16:creationId xmlns:a16="http://schemas.microsoft.com/office/drawing/2014/main" id="{4A722B05-C2C8-49FF-AA4F-43DBA8088A08}"/>
+          <p:cNvPr id="12" name="Conector de Seta Reta 11">
+            <a:extLst>
+              <a:ext uri="{FF2B5EF4-FFF2-40B4-BE49-F238E27FC236}">
+                <a16:creationId xmlns:a16="http://schemas.microsoft.com/office/drawing/2014/main" id="{77FDDD4D-62B7-4E68-96B7-C034157F9023}"/>
               </a:ext>
             </a:extLst>
           </p:cNvPr>
           <p:cNvCxnSpPr>
             <a:cxnSpLocks/>
-            <a:stCxn id="4" idx="3"/>
-            <a:endCxn id="5" idx="2"/>
+            <a:stCxn id="6" idx="3"/>
+            <a:endCxn id="8" idx="2"/>
           </p:cNvCxnSpPr>
           <p:nvPr/>
         </p:nvCxnSpPr>
         <p:spPr>
           <a:xfrm flipV="1">
-            <a:off x="2261481" y="1406029"/>
-            <a:ext cx="1972163" cy="2978469"/>
+            <a:off x="926669" y="1066462"/>
+            <a:ext cx="1460931" cy="762338"/>
           </a:xfrm>
           <a:prstGeom prst="straightConnector1">
             <a:avLst/>
@@ -5492,26 +5882,82 @@
           </a:fontRef>
         </p:style>
       </p:cxnSp>
+      <p:sp>
+        <p:nvSpPr>
+          <p:cNvPr id="23" name="Elipse 22">
+            <a:extLst>
+              <a:ext uri="{FF2B5EF4-FFF2-40B4-BE49-F238E27FC236}">
+                <a16:creationId xmlns:a16="http://schemas.microsoft.com/office/drawing/2014/main" id="{A73AF9CF-B3DC-4652-AB6D-D19E71791C3B}"/>
+              </a:ext>
+            </a:extLst>
+          </p:cNvPr>
+          <p:cNvSpPr/>
+          <p:nvPr/>
+        </p:nvSpPr>
+        <p:spPr>
+          <a:xfrm>
+            <a:off x="2387600" y="1978486"/>
+            <a:ext cx="2044700" cy="912024"/>
+          </a:xfrm>
+          <a:prstGeom prst="ellipse">
+            <a:avLst/>
+          </a:prstGeom>
+        </p:spPr>
+        <p:style>
+          <a:lnRef idx="2">
+            <a:schemeClr val="accent1">
+              <a:shade val="50000"/>
+            </a:schemeClr>
+          </a:lnRef>
+          <a:fillRef idx="1">
+            <a:schemeClr val="accent1"/>
+          </a:fillRef>
+          <a:effectRef idx="0">
+            <a:schemeClr val="accent1"/>
+          </a:effectRef>
+          <a:fontRef idx="minor">
+            <a:schemeClr val="lt1"/>
+          </a:fontRef>
+        </p:style>
+        <p:txBody>
+          <a:bodyPr rtlCol="0" anchor="ctr"/>
+          <a:lstStyle/>
+          <a:p>
+            <a:pPr algn="ctr"/>
+            <a:r>
+              <a:rPr lang="pt-BR" dirty="0"/>
+              <a:t>Gerar Ordem Serviço</a:t>
+            </a:r>
+          </a:p>
+          <a:p>
+            <a:pPr algn="ctr"/>
+            <a:r>
+              <a:rPr lang="pt-BR" dirty="0"/>
+              <a:t>Equipamento</a:t>
+            </a:r>
+          </a:p>
+        </p:txBody>
+      </p:sp>
       <p:cxnSp>
         <p:nvCxnSpPr>
-          <p:cNvPr id="19" name="Conector de Seta Reta 18">
-            <a:extLst>
-              <a:ext uri="{FF2B5EF4-FFF2-40B4-BE49-F238E27FC236}">
-                <a16:creationId xmlns:a16="http://schemas.microsoft.com/office/drawing/2014/main" id="{0AC945D9-3732-4776-BEE8-FFF3870B64AB}"/>
+          <p:cNvPr id="24" name="Conector de Seta Reta 23">
+            <a:extLst>
+              <a:ext uri="{FF2B5EF4-FFF2-40B4-BE49-F238E27FC236}">
+                <a16:creationId xmlns:a16="http://schemas.microsoft.com/office/drawing/2014/main" id="{D8DBC775-32C9-4B29-8651-E1BCF554BB7C}"/>
               </a:ext>
             </a:extLst>
           </p:cNvPr>
           <p:cNvCxnSpPr>
             <a:cxnSpLocks/>
-            <a:stCxn id="4" idx="3"/>
-            <a:endCxn id="6" idx="2"/>
+            <a:stCxn id="6" idx="3"/>
+            <a:endCxn id="23" idx="2"/>
           </p:cNvCxnSpPr>
           <p:nvPr/>
         </p:nvCxnSpPr>
         <p:spPr>
-          <a:xfrm flipV="1">
-            <a:off x="2261481" y="2698754"/>
-            <a:ext cx="1972163" cy="1685744"/>
+          <a:xfrm>
+            <a:off x="926669" y="1828800"/>
+            <a:ext cx="1460931" cy="605698"/>
           </a:xfrm>
           <a:prstGeom prst="straightConnector1">
             <a:avLst/>
@@ -5535,12 +5981,81 @@
           </a:fontRef>
         </p:style>
       </p:cxnSp>
+    </p:spTree>
+    <p:extLst>
+      <p:ext uri="{BB962C8B-B14F-4D97-AF65-F5344CB8AC3E}">
+        <p14:creationId xmlns:p14="http://schemas.microsoft.com/office/powerpoint/2010/main" val="3355162035"/>
+      </p:ext>
+    </p:extLst>
+  </p:cSld>
+  <p:clrMapOvr>
+    <a:masterClrMapping/>
+  </p:clrMapOvr>
+</p:sld>
+</file>
+
+<file path=ppt/slides/slide4.xml><?xml version="1.0" encoding="utf-8"?>
+<p:sld xmlns:a="http://schemas.openxmlformats.org/drawingml/2006/main" xmlns:r="http://schemas.openxmlformats.org/officeDocument/2006/relationships" xmlns:p="http://schemas.openxmlformats.org/presentationml/2006/main">
+  <p:cSld>
+    <p:spTree>
+      <p:nvGrpSpPr>
+        <p:cNvPr id="1" name=""/>
+        <p:cNvGrpSpPr/>
+        <p:nvPr/>
+      </p:nvGrpSpPr>
+      <p:grpSpPr>
+        <a:xfrm>
+          <a:off x="0" y="0"/>
+          <a:ext cx="0" cy="0"/>
+          <a:chOff x="0" y="0"/>
+          <a:chExt cx="0" cy="0"/>
+        </a:xfrm>
+      </p:grpSpPr>
+      <p:sp>
+        <p:nvSpPr>
+          <p:cNvPr id="4" name="CaixaDeTexto 3">
+            <a:extLst>
+              <a:ext uri="{FF2B5EF4-FFF2-40B4-BE49-F238E27FC236}">
+                <a16:creationId xmlns:a16="http://schemas.microsoft.com/office/drawing/2014/main" id="{389FE415-E5C2-4556-A7E4-EBB241FA8B62}"/>
+              </a:ext>
+            </a:extLst>
+          </p:cNvPr>
+          <p:cNvSpPr txBox="1"/>
+          <p:nvPr/>
+        </p:nvSpPr>
+        <p:spPr>
+          <a:xfrm>
+            <a:off x="215900" y="368300"/>
+            <a:ext cx="3067378" cy="369332"/>
+          </a:xfrm>
+          <a:prstGeom prst="rect">
+            <a:avLst/>
+          </a:prstGeom>
+          <a:noFill/>
+        </p:spPr>
+        <p:txBody>
+          <a:bodyPr wrap="none" rtlCol="0">
+            <a:spAutoFit/>
+          </a:bodyPr>
+          <a:lstStyle/>
+          <a:p>
+            <a:pPr marL="285750" indent="-285750">
+              <a:buFont typeface="Wingdings" panose="05000000000000000000" pitchFamily="2" charset="2"/>
+              <a:buChar char="Ø"/>
+            </a:pPr>
+            <a:r>
+              <a:rPr lang="pt-BR" dirty="0"/>
+              <a:t>Permissão e gerenciamento</a:t>
+            </a:r>
+          </a:p>
+        </p:txBody>
+      </p:sp>
       <p:pic>
         <p:nvPicPr>
-          <p:cNvPr id="22" name="Picture 2" descr="Stick figure - Wikipedia">
-            <a:extLst>
-              <a:ext uri="{FF2B5EF4-FFF2-40B4-BE49-F238E27FC236}">
-                <a16:creationId xmlns:a16="http://schemas.microsoft.com/office/drawing/2014/main" id="{B628B5A1-B3E6-4943-A8A0-E850E910B536}"/>
+          <p:cNvPr id="5" name="Picture 2" descr="Stick figure - Wikipedia">
+            <a:extLst>
+              <a:ext uri="{FF2B5EF4-FFF2-40B4-BE49-F238E27FC236}">
+                <a16:creationId xmlns:a16="http://schemas.microsoft.com/office/drawing/2014/main" id="{FD4164C1-46C4-463B-BEDF-BA22BD799A01}"/>
               </a:ext>
             </a:extLst>
           </p:cNvPr>
@@ -5564,7 +6079,7 @@
         </p:blipFill>
         <p:spPr bwMode="auto">
           <a:xfrm>
-            <a:off x="1681397" y="927434"/>
+            <a:off x="563797" y="1412887"/>
             <a:ext cx="607429" cy="1124958"/>
           </a:xfrm>
           <a:prstGeom prst="rect">
@@ -5582,26 +6097,496 @@
           </a:extLst>
         </p:spPr>
       </p:pic>
+      <p:pic>
+        <p:nvPicPr>
+          <p:cNvPr id="6" name="Picture 2" descr="Stick figure - Wikipedia">
+            <a:extLst>
+              <a:ext uri="{FF2B5EF4-FFF2-40B4-BE49-F238E27FC236}">
+                <a16:creationId xmlns:a16="http://schemas.microsoft.com/office/drawing/2014/main" id="{F013B1E6-7877-4B27-8DF5-84D5510B130A}"/>
+              </a:ext>
+            </a:extLst>
+          </p:cNvPr>
+          <p:cNvPicPr>
+            <a:picLocks noChangeAspect="1" noChangeArrowheads="1"/>
+          </p:cNvPicPr>
+          <p:nvPr/>
+        </p:nvPicPr>
+        <p:blipFill>
+          <a:blip r:embed="rId2">
+            <a:extLst>
+              <a:ext uri="{28A0092B-C50C-407E-A947-70E740481C1C}">
+                <a14:useLocalDpi xmlns:a14="http://schemas.microsoft.com/office/drawing/2010/main" val="0"/>
+              </a:ext>
+            </a:extLst>
+          </a:blip>
+          <a:srcRect/>
+          <a:stretch>
+            <a:fillRect/>
+          </a:stretch>
+        </p:blipFill>
+        <p:spPr bwMode="auto">
+          <a:xfrm>
+            <a:off x="633646" y="3930984"/>
+            <a:ext cx="607429" cy="1124958"/>
+          </a:xfrm>
+          <a:prstGeom prst="rect">
+            <a:avLst/>
+          </a:prstGeom>
+          <a:noFill/>
+          <a:extLst>
+            <a:ext uri="{909E8E84-426E-40DD-AFC4-6F175D3DCCD1}">
+              <a14:hiddenFill xmlns:a14="http://schemas.microsoft.com/office/drawing/2010/main">
+                <a:solidFill>
+                  <a:srgbClr val="FFFFFF"/>
+                </a:solidFill>
+              </a14:hiddenFill>
+            </a:ext>
+          </a:extLst>
+        </p:spPr>
+      </p:pic>
+      <p:sp>
+        <p:nvSpPr>
+          <p:cNvPr id="7" name="Elipse 6">
+            <a:extLst>
+              <a:ext uri="{FF2B5EF4-FFF2-40B4-BE49-F238E27FC236}">
+                <a16:creationId xmlns:a16="http://schemas.microsoft.com/office/drawing/2014/main" id="{A0C8728D-8FEF-404D-972D-D9FE41EDC52A}"/>
+              </a:ext>
+            </a:extLst>
+          </p:cNvPr>
+          <p:cNvSpPr/>
+          <p:nvPr/>
+        </p:nvSpPr>
+        <p:spPr>
+          <a:xfrm>
+            <a:off x="2568902" y="2610366"/>
+            <a:ext cx="1863398" cy="717884"/>
+          </a:xfrm>
+          <a:prstGeom prst="ellipse">
+            <a:avLst/>
+          </a:prstGeom>
+        </p:spPr>
+        <p:style>
+          <a:lnRef idx="2">
+            <a:schemeClr val="accent1">
+              <a:shade val="50000"/>
+            </a:schemeClr>
+          </a:lnRef>
+          <a:fillRef idx="1">
+            <a:schemeClr val="accent1"/>
+          </a:fillRef>
+          <a:effectRef idx="0">
+            <a:schemeClr val="accent1"/>
+          </a:effectRef>
+          <a:fontRef idx="minor">
+            <a:schemeClr val="lt1"/>
+          </a:fontRef>
+        </p:style>
+        <p:txBody>
+          <a:bodyPr rtlCol="0" anchor="ctr"/>
+          <a:lstStyle/>
+          <a:p>
+            <a:pPr algn="ctr"/>
+            <a:r>
+              <a:rPr lang="pt-BR" dirty="0"/>
+              <a:t>Usuários</a:t>
+            </a:r>
+          </a:p>
+        </p:txBody>
+      </p:sp>
+      <p:sp>
+        <p:nvSpPr>
+          <p:cNvPr id="8" name="Elipse 7">
+            <a:extLst>
+              <a:ext uri="{FF2B5EF4-FFF2-40B4-BE49-F238E27FC236}">
+                <a16:creationId xmlns:a16="http://schemas.microsoft.com/office/drawing/2014/main" id="{8953C6FB-0BB9-4F74-881A-0378A3E82C4E}"/>
+              </a:ext>
+            </a:extLst>
+          </p:cNvPr>
+          <p:cNvSpPr/>
+          <p:nvPr/>
+        </p:nvSpPr>
+        <p:spPr>
+          <a:xfrm>
+            <a:off x="2568902" y="1753480"/>
+            <a:ext cx="1863398" cy="717884"/>
+          </a:xfrm>
+          <a:prstGeom prst="ellipse">
+            <a:avLst/>
+          </a:prstGeom>
+        </p:spPr>
+        <p:style>
+          <a:lnRef idx="2">
+            <a:schemeClr val="accent1">
+              <a:shade val="50000"/>
+            </a:schemeClr>
+          </a:lnRef>
+          <a:fillRef idx="1">
+            <a:schemeClr val="accent1"/>
+          </a:fillRef>
+          <a:effectRef idx="0">
+            <a:schemeClr val="accent1"/>
+          </a:effectRef>
+          <a:fontRef idx="minor">
+            <a:schemeClr val="lt1"/>
+          </a:fontRef>
+        </p:style>
+        <p:txBody>
+          <a:bodyPr rtlCol="0" anchor="ctr"/>
+          <a:lstStyle/>
+          <a:p>
+            <a:pPr algn="ctr"/>
+            <a:r>
+              <a:rPr lang="pt-BR" dirty="0"/>
+              <a:t>Grupos de </a:t>
+            </a:r>
+          </a:p>
+          <a:p>
+            <a:pPr algn="ctr"/>
+            <a:r>
+              <a:rPr lang="pt-BR" dirty="0"/>
+              <a:t>Usuários</a:t>
+            </a:r>
+          </a:p>
+        </p:txBody>
+      </p:sp>
+      <p:sp>
+        <p:nvSpPr>
+          <p:cNvPr id="9" name="Elipse 8">
+            <a:extLst>
+              <a:ext uri="{FF2B5EF4-FFF2-40B4-BE49-F238E27FC236}">
+                <a16:creationId xmlns:a16="http://schemas.microsoft.com/office/drawing/2014/main" id="{8D015AE5-A8B1-4913-9C80-CEC80BF40281}"/>
+              </a:ext>
+            </a:extLst>
+          </p:cNvPr>
+          <p:cNvSpPr/>
+          <p:nvPr/>
+        </p:nvSpPr>
+        <p:spPr>
+          <a:xfrm>
+            <a:off x="2568902" y="867306"/>
+            <a:ext cx="1863398" cy="717884"/>
+          </a:xfrm>
+          <a:prstGeom prst="ellipse">
+            <a:avLst/>
+          </a:prstGeom>
+        </p:spPr>
+        <p:style>
+          <a:lnRef idx="2">
+            <a:schemeClr val="accent1">
+              <a:shade val="50000"/>
+            </a:schemeClr>
+          </a:lnRef>
+          <a:fillRef idx="1">
+            <a:schemeClr val="accent1"/>
+          </a:fillRef>
+          <a:effectRef idx="0">
+            <a:schemeClr val="accent1"/>
+          </a:effectRef>
+          <a:fontRef idx="minor">
+            <a:schemeClr val="lt1"/>
+          </a:fontRef>
+        </p:style>
+        <p:txBody>
+          <a:bodyPr rtlCol="0" anchor="ctr"/>
+          <a:lstStyle/>
+          <a:p>
+            <a:pPr algn="ctr"/>
+            <a:r>
+              <a:rPr lang="pt-BR" dirty="0"/>
+              <a:t>Gerenciar </a:t>
+            </a:r>
+          </a:p>
+          <a:p>
+            <a:pPr algn="ctr"/>
+            <a:r>
+              <a:rPr lang="pt-BR" dirty="0"/>
+              <a:t>OS</a:t>
+            </a:r>
+          </a:p>
+        </p:txBody>
+      </p:sp>
+      <p:sp>
+        <p:nvSpPr>
+          <p:cNvPr id="10" name="CaixaDeTexto 9">
+            <a:extLst>
+              <a:ext uri="{FF2B5EF4-FFF2-40B4-BE49-F238E27FC236}">
+                <a16:creationId xmlns:a16="http://schemas.microsoft.com/office/drawing/2014/main" id="{1ECCF9B6-FBE7-4BAF-A4EE-E8A0195B1770}"/>
+              </a:ext>
+            </a:extLst>
+          </p:cNvPr>
+          <p:cNvSpPr txBox="1"/>
+          <p:nvPr/>
+        </p:nvSpPr>
+        <p:spPr>
+          <a:xfrm>
+            <a:off x="547337" y="2425700"/>
+            <a:ext cx="623889" cy="369332"/>
+          </a:xfrm>
+          <a:prstGeom prst="rect">
+            <a:avLst/>
+          </a:prstGeom>
+          <a:noFill/>
+        </p:spPr>
+        <p:txBody>
+          <a:bodyPr wrap="none" rtlCol="0">
+            <a:spAutoFit/>
+          </a:bodyPr>
+          <a:lstStyle/>
+          <a:p>
+            <a:r>
+              <a:rPr lang="pt-BR" dirty="0" err="1"/>
+              <a:t>Adm</a:t>
+            </a:r>
+            <a:endParaRPr lang="pt-BR" dirty="0"/>
+          </a:p>
+        </p:txBody>
+      </p:sp>
+      <p:sp>
+        <p:nvSpPr>
+          <p:cNvPr id="11" name="Elipse 10">
+            <a:extLst>
+              <a:ext uri="{FF2B5EF4-FFF2-40B4-BE49-F238E27FC236}">
+                <a16:creationId xmlns:a16="http://schemas.microsoft.com/office/drawing/2014/main" id="{CF47A9FE-810B-4A7B-94C1-260F986B6E9C}"/>
+              </a:ext>
+            </a:extLst>
+          </p:cNvPr>
+          <p:cNvSpPr/>
+          <p:nvPr/>
+        </p:nvSpPr>
+        <p:spPr>
+          <a:xfrm>
+            <a:off x="2568902" y="3429000"/>
+            <a:ext cx="1863398" cy="717884"/>
+          </a:xfrm>
+          <a:prstGeom prst="ellipse">
+            <a:avLst/>
+          </a:prstGeom>
+        </p:spPr>
+        <p:style>
+          <a:lnRef idx="2">
+            <a:schemeClr val="accent1">
+              <a:shade val="50000"/>
+            </a:schemeClr>
+          </a:lnRef>
+          <a:fillRef idx="1">
+            <a:schemeClr val="accent1"/>
+          </a:fillRef>
+          <a:effectRef idx="0">
+            <a:schemeClr val="accent1"/>
+          </a:effectRef>
+          <a:fontRef idx="minor">
+            <a:schemeClr val="lt1"/>
+          </a:fontRef>
+        </p:style>
+        <p:txBody>
+          <a:bodyPr rtlCol="0" anchor="ctr"/>
+          <a:lstStyle/>
+          <a:p>
+            <a:pPr algn="ctr"/>
+            <a:r>
+              <a:rPr lang="pt-BR" dirty="0"/>
+              <a:t>Modelo OS</a:t>
+            </a:r>
+          </a:p>
+        </p:txBody>
+      </p:sp>
+      <p:sp>
+        <p:nvSpPr>
+          <p:cNvPr id="12" name="Elipse 11">
+            <a:extLst>
+              <a:ext uri="{FF2B5EF4-FFF2-40B4-BE49-F238E27FC236}">
+                <a16:creationId xmlns:a16="http://schemas.microsoft.com/office/drawing/2014/main" id="{0DA70CD9-302B-4190-91CE-95C54E31F191}"/>
+              </a:ext>
+            </a:extLst>
+          </p:cNvPr>
+          <p:cNvSpPr/>
+          <p:nvPr/>
+        </p:nvSpPr>
+        <p:spPr>
+          <a:xfrm>
+            <a:off x="2568902" y="4247634"/>
+            <a:ext cx="1863398" cy="717884"/>
+          </a:xfrm>
+          <a:prstGeom prst="ellipse">
+            <a:avLst/>
+          </a:prstGeom>
+        </p:spPr>
+        <p:style>
+          <a:lnRef idx="2">
+            <a:schemeClr val="accent1">
+              <a:shade val="50000"/>
+            </a:schemeClr>
+          </a:lnRef>
+          <a:fillRef idx="1">
+            <a:schemeClr val="accent1"/>
+          </a:fillRef>
+          <a:effectRef idx="0">
+            <a:schemeClr val="accent1"/>
+          </a:effectRef>
+          <a:fontRef idx="minor">
+            <a:schemeClr val="lt1"/>
+          </a:fontRef>
+        </p:style>
+        <p:txBody>
+          <a:bodyPr rtlCol="0" anchor="ctr"/>
+          <a:lstStyle/>
+          <a:p>
+            <a:pPr algn="ctr"/>
+            <a:r>
+              <a:rPr lang="pt-BR" dirty="0"/>
+              <a:t>Ocorrências</a:t>
+            </a:r>
+          </a:p>
+        </p:txBody>
+      </p:sp>
       <p:cxnSp>
         <p:nvCxnSpPr>
-          <p:cNvPr id="23" name="Conector de Seta Reta 22">
-            <a:extLst>
-              <a:ext uri="{FF2B5EF4-FFF2-40B4-BE49-F238E27FC236}">
-                <a16:creationId xmlns:a16="http://schemas.microsoft.com/office/drawing/2014/main" id="{87B34B41-B701-475D-9D81-23680E3035BF}"/>
+          <p:cNvPr id="14" name="Conector de Seta Reta 13">
+            <a:extLst>
+              <a:ext uri="{FF2B5EF4-FFF2-40B4-BE49-F238E27FC236}">
+                <a16:creationId xmlns:a16="http://schemas.microsoft.com/office/drawing/2014/main" id="{5B5A0890-0903-4B13-8A30-8DF607342E47}"/>
+              </a:ext>
+            </a:extLst>
+          </p:cNvPr>
+          <p:cNvCxnSpPr>
+            <a:stCxn id="5" idx="3"/>
+            <a:endCxn id="9" idx="2"/>
+          </p:cNvCxnSpPr>
+          <p:nvPr/>
+        </p:nvCxnSpPr>
+        <p:spPr>
+          <a:xfrm flipV="1">
+            <a:off x="1171226" y="1226248"/>
+            <a:ext cx="1397676" cy="749118"/>
+          </a:xfrm>
+          <a:prstGeom prst="straightConnector1">
+            <a:avLst/>
+          </a:prstGeom>
+          <a:ln>
+            <a:tailEnd type="triangle"/>
+          </a:ln>
+        </p:spPr>
+        <p:style>
+          <a:lnRef idx="1">
+            <a:schemeClr val="accent1"/>
+          </a:lnRef>
+          <a:fillRef idx="0">
+            <a:schemeClr val="accent1"/>
+          </a:fillRef>
+          <a:effectRef idx="0">
+            <a:schemeClr val="accent1"/>
+          </a:effectRef>
+          <a:fontRef idx="minor">
+            <a:schemeClr val="tx1"/>
+          </a:fontRef>
+        </p:style>
+      </p:cxnSp>
+      <p:cxnSp>
+        <p:nvCxnSpPr>
+          <p:cNvPr id="15" name="Conector de Seta Reta 14">
+            <a:extLst>
+              <a:ext uri="{FF2B5EF4-FFF2-40B4-BE49-F238E27FC236}">
+                <a16:creationId xmlns:a16="http://schemas.microsoft.com/office/drawing/2014/main" id="{C576B977-2FB0-404D-A3E8-25EB1670B6E6}"/>
               </a:ext>
             </a:extLst>
           </p:cNvPr>
           <p:cNvCxnSpPr>
             <a:cxnSpLocks/>
-            <a:stCxn id="22" idx="3"/>
+            <a:stCxn id="5" idx="3"/>
+            <a:endCxn id="8" idx="2"/>
+          </p:cNvCxnSpPr>
+          <p:nvPr/>
+        </p:nvCxnSpPr>
+        <p:spPr>
+          <a:xfrm>
+            <a:off x="1171226" y="1975366"/>
+            <a:ext cx="1397676" cy="137056"/>
+          </a:xfrm>
+          <a:prstGeom prst="straightConnector1">
+            <a:avLst/>
+          </a:prstGeom>
+          <a:ln>
+            <a:tailEnd type="triangle"/>
+          </a:ln>
+        </p:spPr>
+        <p:style>
+          <a:lnRef idx="1">
+            <a:schemeClr val="accent1"/>
+          </a:lnRef>
+          <a:fillRef idx="0">
+            <a:schemeClr val="accent1"/>
+          </a:fillRef>
+          <a:effectRef idx="0">
+            <a:schemeClr val="accent1"/>
+          </a:effectRef>
+          <a:fontRef idx="minor">
+            <a:schemeClr val="tx1"/>
+          </a:fontRef>
+        </p:style>
+      </p:cxnSp>
+      <p:cxnSp>
+        <p:nvCxnSpPr>
+          <p:cNvPr id="16" name="Conector de Seta Reta 15">
+            <a:extLst>
+              <a:ext uri="{FF2B5EF4-FFF2-40B4-BE49-F238E27FC236}">
+                <a16:creationId xmlns:a16="http://schemas.microsoft.com/office/drawing/2014/main" id="{3113BE77-E65E-45B5-A11C-B9ECD51724C1}"/>
+              </a:ext>
+            </a:extLst>
+          </p:cNvPr>
+          <p:cNvCxnSpPr>
+            <a:cxnSpLocks/>
+            <a:stCxn id="5" idx="3"/>
             <a:endCxn id="7" idx="2"/>
           </p:cNvCxnSpPr>
           <p:nvPr/>
         </p:nvCxnSpPr>
         <p:spPr>
           <a:xfrm>
-            <a:off x="2288826" y="1489913"/>
-            <a:ext cx="1944818" cy="2501566"/>
+            <a:off x="1171226" y="1975366"/>
+            <a:ext cx="1397676" cy="993942"/>
+          </a:xfrm>
+          <a:prstGeom prst="straightConnector1">
+            <a:avLst/>
+          </a:prstGeom>
+          <a:ln>
+            <a:tailEnd type="triangle"/>
+          </a:ln>
+        </p:spPr>
+        <p:style>
+          <a:lnRef idx="1">
+            <a:schemeClr val="accent1"/>
+          </a:lnRef>
+          <a:fillRef idx="0">
+            <a:schemeClr val="accent1"/>
+          </a:fillRef>
+          <a:effectRef idx="0">
+            <a:schemeClr val="accent1"/>
+          </a:effectRef>
+          <a:fontRef idx="minor">
+            <a:schemeClr val="tx1"/>
+          </a:fontRef>
+        </p:style>
+      </p:cxnSp>
+      <p:cxnSp>
+        <p:nvCxnSpPr>
+          <p:cNvPr id="17" name="Conector de Seta Reta 16">
+            <a:extLst>
+              <a:ext uri="{FF2B5EF4-FFF2-40B4-BE49-F238E27FC236}">
+                <a16:creationId xmlns:a16="http://schemas.microsoft.com/office/drawing/2014/main" id="{7D354145-ABDA-4EBC-8DD8-C620D09A8647}"/>
+              </a:ext>
+            </a:extLst>
+          </p:cNvPr>
+          <p:cNvCxnSpPr>
+            <a:cxnSpLocks/>
+            <a:stCxn id="5" idx="3"/>
+            <a:endCxn id="12" idx="2"/>
+          </p:cNvCxnSpPr>
+          <p:nvPr/>
+        </p:nvCxnSpPr>
+        <p:spPr>
+          <a:xfrm>
+            <a:off x="1171226" y="1975366"/>
+            <a:ext cx="1397676" cy="2631210"/>
           </a:xfrm>
           <a:prstGeom prst="straightConnector1">
             <a:avLst/>
@@ -5630,21 +6615,21 @@
           <p:cNvPr id="26" name="Conector de Seta Reta 25">
             <a:extLst>
               <a:ext uri="{FF2B5EF4-FFF2-40B4-BE49-F238E27FC236}">
-                <a16:creationId xmlns:a16="http://schemas.microsoft.com/office/drawing/2014/main" id="{ACE9330B-A43C-45E0-B168-6E34FCA6867F}"/>
+                <a16:creationId xmlns:a16="http://schemas.microsoft.com/office/drawing/2014/main" id="{5D3036BC-26AB-430A-8EF4-0EE7CABE092A}"/>
               </a:ext>
             </a:extLst>
           </p:cNvPr>
           <p:cNvCxnSpPr>
             <a:cxnSpLocks/>
-            <a:stCxn id="22" idx="3"/>
-            <a:endCxn id="12" idx="2"/>
+            <a:stCxn id="5" idx="3"/>
+            <a:endCxn id="11" idx="2"/>
           </p:cNvCxnSpPr>
           <p:nvPr/>
         </p:nvCxnSpPr>
         <p:spPr>
           <a:xfrm>
-            <a:off x="2288826" y="1489913"/>
-            <a:ext cx="1944818" cy="3876514"/>
+            <a:off x="1171226" y="1975366"/>
+            <a:ext cx="1397676" cy="1812576"/>
           </a:xfrm>
           <a:prstGeom prst="straightConnector1">
             <a:avLst/>
@@ -5671,7 +6656,7 @@
     </p:spTree>
     <p:extLst>
       <p:ext uri="{BB962C8B-B14F-4D97-AF65-F5344CB8AC3E}">
-        <p14:creationId xmlns:p14="http://schemas.microsoft.com/office/powerpoint/2010/main" val="2302770851"/>
+        <p14:creationId xmlns:p14="http://schemas.microsoft.com/office/powerpoint/2010/main" val="556009110"/>
       </p:ext>
     </p:extLst>
   </p:cSld>

</xml_diff>

<commit_message>
Foi criado três slides.
</commit_message>
<xml_diff>
--- a/docs/DiagramaCasoDeUso.pptx
+++ b/docs/DiagramaCasoDeUso.pptx
@@ -9,6 +9,8 @@
     <p:sldId id="257" r:id="rId3"/>
     <p:sldId id="258" r:id="rId4"/>
     <p:sldId id="259" r:id="rId5"/>
+    <p:sldId id="260" r:id="rId6"/>
+    <p:sldId id="261" r:id="rId7"/>
   </p:sldIdLst>
   <p:sldSz cx="12192000" cy="6858000"/>
   <p:notesSz cx="6858000" cy="9144000"/>
@@ -274,7 +276,7 @@
           <a:p>
             <a:fld id="{C01E3D7C-ADA5-47A3-8E90-C672760382AC}" type="datetimeFigureOut">
               <a:rPr lang="pt-BR" smtClean="0"/>
-              <a:t>30/04/2025</a:t>
+              <a:t>05/05/2025</a:t>
             </a:fld>
             <a:endParaRPr lang="pt-BR"/>
           </a:p>
@@ -472,7 +474,7 @@
           <a:p>
             <a:fld id="{C01E3D7C-ADA5-47A3-8E90-C672760382AC}" type="datetimeFigureOut">
               <a:rPr lang="pt-BR" smtClean="0"/>
-              <a:t>30/04/2025</a:t>
+              <a:t>05/05/2025</a:t>
             </a:fld>
             <a:endParaRPr lang="pt-BR"/>
           </a:p>
@@ -680,7 +682,7 @@
           <a:p>
             <a:fld id="{C01E3D7C-ADA5-47A3-8E90-C672760382AC}" type="datetimeFigureOut">
               <a:rPr lang="pt-BR" smtClean="0"/>
-              <a:t>30/04/2025</a:t>
+              <a:t>05/05/2025</a:t>
             </a:fld>
             <a:endParaRPr lang="pt-BR"/>
           </a:p>
@@ -878,7 +880,7 @@
           <a:p>
             <a:fld id="{C01E3D7C-ADA5-47A3-8E90-C672760382AC}" type="datetimeFigureOut">
               <a:rPr lang="pt-BR" smtClean="0"/>
-              <a:t>30/04/2025</a:t>
+              <a:t>05/05/2025</a:t>
             </a:fld>
             <a:endParaRPr lang="pt-BR"/>
           </a:p>
@@ -1153,7 +1155,7 @@
           <a:p>
             <a:fld id="{C01E3D7C-ADA5-47A3-8E90-C672760382AC}" type="datetimeFigureOut">
               <a:rPr lang="pt-BR" smtClean="0"/>
-              <a:t>30/04/2025</a:t>
+              <a:t>05/05/2025</a:t>
             </a:fld>
             <a:endParaRPr lang="pt-BR"/>
           </a:p>
@@ -1418,7 +1420,7 @@
           <a:p>
             <a:fld id="{C01E3D7C-ADA5-47A3-8E90-C672760382AC}" type="datetimeFigureOut">
               <a:rPr lang="pt-BR" smtClean="0"/>
-              <a:t>30/04/2025</a:t>
+              <a:t>05/05/2025</a:t>
             </a:fld>
             <a:endParaRPr lang="pt-BR"/>
           </a:p>
@@ -1830,7 +1832,7 @@
           <a:p>
             <a:fld id="{C01E3D7C-ADA5-47A3-8E90-C672760382AC}" type="datetimeFigureOut">
               <a:rPr lang="pt-BR" smtClean="0"/>
-              <a:t>30/04/2025</a:t>
+              <a:t>05/05/2025</a:t>
             </a:fld>
             <a:endParaRPr lang="pt-BR"/>
           </a:p>
@@ -1971,7 +1973,7 @@
           <a:p>
             <a:fld id="{C01E3D7C-ADA5-47A3-8E90-C672760382AC}" type="datetimeFigureOut">
               <a:rPr lang="pt-BR" smtClean="0"/>
-              <a:t>30/04/2025</a:t>
+              <a:t>05/05/2025</a:t>
             </a:fld>
             <a:endParaRPr lang="pt-BR"/>
           </a:p>
@@ -2084,7 +2086,7 @@
           <a:p>
             <a:fld id="{C01E3D7C-ADA5-47A3-8E90-C672760382AC}" type="datetimeFigureOut">
               <a:rPr lang="pt-BR" smtClean="0"/>
-              <a:t>30/04/2025</a:t>
+              <a:t>05/05/2025</a:t>
             </a:fld>
             <a:endParaRPr lang="pt-BR"/>
           </a:p>
@@ -2395,7 +2397,7 @@
           <a:p>
             <a:fld id="{C01E3D7C-ADA5-47A3-8E90-C672760382AC}" type="datetimeFigureOut">
               <a:rPr lang="pt-BR" smtClean="0"/>
-              <a:t>30/04/2025</a:t>
+              <a:t>05/05/2025</a:t>
             </a:fld>
             <a:endParaRPr lang="pt-BR"/>
           </a:p>
@@ -2683,7 +2685,7 @@
           <a:p>
             <a:fld id="{C01E3D7C-ADA5-47A3-8E90-C672760382AC}" type="datetimeFigureOut">
               <a:rPr lang="pt-BR" smtClean="0"/>
-              <a:t>30/04/2025</a:t>
+              <a:t>05/05/2025</a:t>
             </a:fld>
             <a:endParaRPr lang="pt-BR"/>
           </a:p>
@@ -2924,7 +2926,7 @@
           <a:p>
             <a:fld id="{C01E3D7C-ADA5-47A3-8E90-C672760382AC}" type="datetimeFigureOut">
               <a:rPr lang="pt-BR" smtClean="0"/>
-              <a:t>30/04/2025</a:t>
+              <a:t>05/05/2025</a:t>
             </a:fld>
             <a:endParaRPr lang="pt-BR"/>
           </a:p>
@@ -5685,7 +5687,7 @@
         </p:blipFill>
         <p:spPr bwMode="auto">
           <a:xfrm>
-            <a:off x="319240" y="1266321"/>
+            <a:off x="2466822" y="1828799"/>
             <a:ext cx="607429" cy="1124958"/>
           </a:xfrm>
           <a:prstGeom prst="rect">
@@ -5717,7 +5719,7 @@
         </p:nvSpPr>
         <p:spPr>
           <a:xfrm>
-            <a:off x="2387600" y="610450"/>
+            <a:off x="5231468" y="880214"/>
             <a:ext cx="2044700" cy="912024"/>
           </a:xfrm>
           <a:prstGeom prst="ellipse">
@@ -5773,7 +5775,7 @@
         </p:nvSpPr>
         <p:spPr>
           <a:xfrm>
-            <a:off x="15526" y="241118"/>
+            <a:off x="199675" y="91432"/>
             <a:ext cx="1717201" cy="369332"/>
           </a:xfrm>
           <a:prstGeom prst="rect">
@@ -5812,7 +5814,7 @@
         </p:nvSpPr>
         <p:spPr>
           <a:xfrm>
-            <a:off x="199675" y="2307426"/>
+            <a:off x="2310340" y="2850625"/>
             <a:ext cx="968535" cy="646331"/>
           </a:xfrm>
           <a:prstGeom prst="rect">
@@ -5857,8 +5859,8 @@
         </p:nvCxnSpPr>
         <p:spPr>
           <a:xfrm flipV="1">
-            <a:off x="926669" y="1066462"/>
-            <a:ext cx="1460931" cy="762338"/>
+            <a:off x="3074251" y="1336226"/>
+            <a:ext cx="2157217" cy="1055052"/>
           </a:xfrm>
           <a:prstGeom prst="straightConnector1">
             <a:avLst/>
@@ -5896,7 +5898,7 @@
         </p:nvSpPr>
         <p:spPr>
           <a:xfrm>
-            <a:off x="2387600" y="1978486"/>
+            <a:off x="5231776" y="2667700"/>
             <a:ext cx="2044700" cy="912024"/>
           </a:xfrm>
           <a:prstGeom prst="ellipse">
@@ -5956,8 +5958,8 @@
         </p:nvCxnSpPr>
         <p:spPr>
           <a:xfrm>
-            <a:off x="926669" y="1828800"/>
-            <a:ext cx="1460931" cy="605698"/>
+            <a:off x="3074251" y="2391278"/>
+            <a:ext cx="2157525" cy="732434"/>
           </a:xfrm>
           <a:prstGeom prst="straightConnector1">
             <a:avLst/>
@@ -6126,7 +6128,7 @@
         </p:blipFill>
         <p:spPr bwMode="auto">
           <a:xfrm>
-            <a:off x="633646" y="3930984"/>
+            <a:off x="7915935" y="1552808"/>
             <a:ext cx="607429" cy="1124958"/>
           </a:xfrm>
           <a:prstGeom prst="rect">
@@ -6158,7 +6160,7 @@
         </p:nvSpPr>
         <p:spPr>
           <a:xfrm>
-            <a:off x="2568902" y="2610366"/>
+            <a:off x="3130964" y="2626910"/>
             <a:ext cx="1863398" cy="717884"/>
           </a:xfrm>
           <a:prstGeom prst="ellipse">
@@ -6207,7 +6209,7 @@
         </p:nvSpPr>
         <p:spPr>
           <a:xfrm>
-            <a:off x="2568902" y="1753480"/>
+            <a:off x="3091156" y="1724071"/>
             <a:ext cx="1863398" cy="717884"/>
           </a:xfrm>
           <a:prstGeom prst="ellipse">
@@ -6263,7 +6265,7 @@
         </p:nvSpPr>
         <p:spPr>
           <a:xfrm>
-            <a:off x="2568902" y="867306"/>
+            <a:off x="3130964" y="834924"/>
             <a:ext cx="1863398" cy="717884"/>
           </a:xfrm>
           <a:prstGeom prst="ellipse">
@@ -6355,7 +6357,7 @@
         </p:nvSpPr>
         <p:spPr>
           <a:xfrm>
-            <a:off x="2568902" y="3429000"/>
+            <a:off x="3130964" y="3497942"/>
             <a:ext cx="1863398" cy="717884"/>
           </a:xfrm>
           <a:prstGeom prst="ellipse">
@@ -6404,7 +6406,7 @@
         </p:nvSpPr>
         <p:spPr>
           <a:xfrm>
-            <a:off x="2568902" y="4247634"/>
+            <a:off x="3189687" y="4524470"/>
             <a:ext cx="1863398" cy="717884"/>
           </a:xfrm>
           <a:prstGeom prst="ellipse">
@@ -6456,8 +6458,8 @@
         </p:nvCxnSpPr>
         <p:spPr>
           <a:xfrm flipV="1">
-            <a:off x="1171226" y="1226248"/>
-            <a:ext cx="1397676" cy="749118"/>
+            <a:off x="1171226" y="1193866"/>
+            <a:ext cx="1959738" cy="781500"/>
           </a:xfrm>
           <a:prstGeom prst="straightConnector1">
             <a:avLst/>
@@ -6500,7 +6502,7 @@
         <p:spPr>
           <a:xfrm>
             <a:off x="1171226" y="1975366"/>
-            <a:ext cx="1397676" cy="137056"/>
+            <a:ext cx="1919930" cy="107647"/>
           </a:xfrm>
           <a:prstGeom prst="straightConnector1">
             <a:avLst/>
@@ -6543,7 +6545,7 @@
         <p:spPr>
           <a:xfrm>
             <a:off x="1171226" y="1975366"/>
-            <a:ext cx="1397676" cy="993942"/>
+            <a:ext cx="1959738" cy="1010486"/>
           </a:xfrm>
           <a:prstGeom prst="straightConnector1">
             <a:avLst/>
@@ -6586,7 +6588,7 @@
         <p:spPr>
           <a:xfrm>
             <a:off x="1171226" y="1975366"/>
-            <a:ext cx="1397676" cy="2631210"/>
+            <a:ext cx="2018461" cy="2908046"/>
           </a:xfrm>
           <a:prstGeom prst="straightConnector1">
             <a:avLst/>
@@ -6629,7 +6631,214 @@
         <p:spPr>
           <a:xfrm>
             <a:off x="1171226" y="1975366"/>
-            <a:ext cx="1397676" cy="1812576"/>
+            <a:ext cx="1959738" cy="1881518"/>
+          </a:xfrm>
+          <a:prstGeom prst="straightConnector1">
+            <a:avLst/>
+          </a:prstGeom>
+          <a:ln>
+            <a:tailEnd type="triangle"/>
+          </a:ln>
+        </p:spPr>
+        <p:style>
+          <a:lnRef idx="1">
+            <a:schemeClr val="accent1"/>
+          </a:lnRef>
+          <a:fillRef idx="0">
+            <a:schemeClr val="accent1"/>
+          </a:fillRef>
+          <a:effectRef idx="0">
+            <a:schemeClr val="accent1"/>
+          </a:effectRef>
+          <a:fontRef idx="minor">
+            <a:schemeClr val="tx1"/>
+          </a:fontRef>
+        </p:style>
+      </p:cxnSp>
+      <p:sp>
+        <p:nvSpPr>
+          <p:cNvPr id="2" name="CaixaDeTexto 1">
+            <a:extLst>
+              <a:ext uri="{FF2B5EF4-FFF2-40B4-BE49-F238E27FC236}">
+                <a16:creationId xmlns:a16="http://schemas.microsoft.com/office/drawing/2014/main" id="{2B23982B-331C-44B8-B2E8-BB88EB7E7853}"/>
+              </a:ext>
+            </a:extLst>
+          </p:cNvPr>
+          <p:cNvSpPr txBox="1"/>
+          <p:nvPr/>
+        </p:nvSpPr>
+        <p:spPr>
+          <a:xfrm>
+            <a:off x="7765038" y="2487905"/>
+            <a:ext cx="909223" cy="369332"/>
+          </a:xfrm>
+          <a:prstGeom prst="rect">
+            <a:avLst/>
+          </a:prstGeom>
+          <a:noFill/>
+        </p:spPr>
+        <p:txBody>
+          <a:bodyPr wrap="none" rtlCol="0">
+            <a:spAutoFit/>
+          </a:bodyPr>
+          <a:lstStyle/>
+          <a:p>
+            <a:r>
+              <a:rPr lang="pt-BR" dirty="0"/>
+              <a:t>Usuário</a:t>
+            </a:r>
+          </a:p>
+        </p:txBody>
+      </p:sp>
+      <p:cxnSp>
+        <p:nvCxnSpPr>
+          <p:cNvPr id="13" name="Conector de Seta Reta 12">
+            <a:extLst>
+              <a:ext uri="{FF2B5EF4-FFF2-40B4-BE49-F238E27FC236}">
+                <a16:creationId xmlns:a16="http://schemas.microsoft.com/office/drawing/2014/main" id="{4EA341DA-2FD7-4135-BDDD-DB4DA38F543D}"/>
+              </a:ext>
+            </a:extLst>
+          </p:cNvPr>
+          <p:cNvCxnSpPr>
+            <a:cxnSpLocks/>
+            <a:stCxn id="6" idx="1"/>
+            <a:endCxn id="8" idx="6"/>
+          </p:cNvCxnSpPr>
+          <p:nvPr/>
+        </p:nvCxnSpPr>
+        <p:spPr>
+          <a:xfrm flipH="1" flipV="1">
+            <a:off x="4954554" y="2083013"/>
+            <a:ext cx="2961381" cy="32274"/>
+          </a:xfrm>
+          <a:prstGeom prst="straightConnector1">
+            <a:avLst/>
+          </a:prstGeom>
+          <a:ln>
+            <a:tailEnd type="triangle"/>
+          </a:ln>
+        </p:spPr>
+        <p:style>
+          <a:lnRef idx="1">
+            <a:schemeClr val="accent1"/>
+          </a:lnRef>
+          <a:fillRef idx="0">
+            <a:schemeClr val="accent1"/>
+          </a:fillRef>
+          <a:effectRef idx="0">
+            <a:schemeClr val="accent1"/>
+          </a:effectRef>
+          <a:fontRef idx="minor">
+            <a:schemeClr val="tx1"/>
+          </a:fontRef>
+        </p:style>
+      </p:cxnSp>
+      <p:cxnSp>
+        <p:nvCxnSpPr>
+          <p:cNvPr id="21" name="Conector de Seta Reta 20">
+            <a:extLst>
+              <a:ext uri="{FF2B5EF4-FFF2-40B4-BE49-F238E27FC236}">
+                <a16:creationId xmlns:a16="http://schemas.microsoft.com/office/drawing/2014/main" id="{8EDD4A8A-0844-4B68-8F19-EB854449AAD2}"/>
+              </a:ext>
+            </a:extLst>
+          </p:cNvPr>
+          <p:cNvCxnSpPr>
+            <a:cxnSpLocks/>
+            <a:stCxn id="6" idx="1"/>
+            <a:endCxn id="7" idx="6"/>
+          </p:cNvCxnSpPr>
+          <p:nvPr/>
+        </p:nvCxnSpPr>
+        <p:spPr>
+          <a:xfrm flipH="1">
+            <a:off x="4994362" y="2115287"/>
+            <a:ext cx="2921573" cy="870565"/>
+          </a:xfrm>
+          <a:prstGeom prst="straightConnector1">
+            <a:avLst/>
+          </a:prstGeom>
+          <a:ln>
+            <a:tailEnd type="triangle"/>
+          </a:ln>
+        </p:spPr>
+        <p:style>
+          <a:lnRef idx="1">
+            <a:schemeClr val="accent1"/>
+          </a:lnRef>
+          <a:fillRef idx="0">
+            <a:schemeClr val="accent1"/>
+          </a:fillRef>
+          <a:effectRef idx="0">
+            <a:schemeClr val="accent1"/>
+          </a:effectRef>
+          <a:fontRef idx="minor">
+            <a:schemeClr val="tx1"/>
+          </a:fontRef>
+        </p:style>
+      </p:cxnSp>
+      <p:cxnSp>
+        <p:nvCxnSpPr>
+          <p:cNvPr id="24" name="Conector de Seta Reta 23">
+            <a:extLst>
+              <a:ext uri="{FF2B5EF4-FFF2-40B4-BE49-F238E27FC236}">
+                <a16:creationId xmlns:a16="http://schemas.microsoft.com/office/drawing/2014/main" id="{3D3968BC-47EB-4695-900A-4EAF9352D82D}"/>
+              </a:ext>
+            </a:extLst>
+          </p:cNvPr>
+          <p:cNvCxnSpPr>
+            <a:cxnSpLocks/>
+            <a:stCxn id="6" idx="1"/>
+            <a:endCxn id="12" idx="6"/>
+          </p:cNvCxnSpPr>
+          <p:nvPr/>
+        </p:nvCxnSpPr>
+        <p:spPr>
+          <a:xfrm flipH="1">
+            <a:off x="5053085" y="2115287"/>
+            <a:ext cx="2862850" cy="2768125"/>
+          </a:xfrm>
+          <a:prstGeom prst="straightConnector1">
+            <a:avLst/>
+          </a:prstGeom>
+          <a:ln>
+            <a:tailEnd type="triangle"/>
+          </a:ln>
+        </p:spPr>
+        <p:style>
+          <a:lnRef idx="1">
+            <a:schemeClr val="accent1"/>
+          </a:lnRef>
+          <a:fillRef idx="0">
+            <a:schemeClr val="accent1"/>
+          </a:fillRef>
+          <a:effectRef idx="0">
+            <a:schemeClr val="accent1"/>
+          </a:effectRef>
+          <a:fontRef idx="minor">
+            <a:schemeClr val="tx1"/>
+          </a:fontRef>
+        </p:style>
+      </p:cxnSp>
+      <p:cxnSp>
+        <p:nvCxnSpPr>
+          <p:cNvPr id="27" name="Conector de Seta Reta 26">
+            <a:extLst>
+              <a:ext uri="{FF2B5EF4-FFF2-40B4-BE49-F238E27FC236}">
+                <a16:creationId xmlns:a16="http://schemas.microsoft.com/office/drawing/2014/main" id="{AB0C4684-2629-416F-BDE2-F14AEB4054AD}"/>
+              </a:ext>
+            </a:extLst>
+          </p:cNvPr>
+          <p:cNvCxnSpPr>
+            <a:cxnSpLocks/>
+            <a:stCxn id="6" idx="1"/>
+            <a:endCxn id="9" idx="6"/>
+          </p:cNvCxnSpPr>
+          <p:nvPr/>
+        </p:nvCxnSpPr>
+        <p:spPr>
+          <a:xfrm flipH="1" flipV="1">
+            <a:off x="4994362" y="1193866"/>
+            <a:ext cx="2921573" cy="921421"/>
           </a:xfrm>
           <a:prstGeom prst="straightConnector1">
             <a:avLst/>
@@ -6657,6 +6866,1240 @@
     <p:extLst>
       <p:ext uri="{BB962C8B-B14F-4D97-AF65-F5344CB8AC3E}">
         <p14:creationId xmlns:p14="http://schemas.microsoft.com/office/powerpoint/2010/main" val="556009110"/>
+      </p:ext>
+    </p:extLst>
+  </p:cSld>
+  <p:clrMapOvr>
+    <a:masterClrMapping/>
+  </p:clrMapOvr>
+</p:sld>
+</file>
+
+<file path=ppt/slides/slide5.xml><?xml version="1.0" encoding="utf-8"?>
+<p:sld xmlns:a="http://schemas.openxmlformats.org/drawingml/2006/main" xmlns:r="http://schemas.openxmlformats.org/officeDocument/2006/relationships" xmlns:p="http://schemas.openxmlformats.org/presentationml/2006/main">
+  <p:cSld>
+    <p:spTree>
+      <p:nvGrpSpPr>
+        <p:cNvPr id="1" name=""/>
+        <p:cNvGrpSpPr/>
+        <p:nvPr/>
+      </p:nvGrpSpPr>
+      <p:grpSpPr>
+        <a:xfrm>
+          <a:off x="0" y="0"/>
+          <a:ext cx="0" cy="0"/>
+          <a:chOff x="0" y="0"/>
+          <a:chExt cx="0" cy="0"/>
+        </a:xfrm>
+      </p:grpSpPr>
+      <p:pic>
+        <p:nvPicPr>
+          <p:cNvPr id="4" name="Picture 2" descr="Stick figure - Wikipedia">
+            <a:extLst>
+              <a:ext uri="{FF2B5EF4-FFF2-40B4-BE49-F238E27FC236}">
+                <a16:creationId xmlns:a16="http://schemas.microsoft.com/office/drawing/2014/main" id="{05B98DEE-A3D3-4E81-9E56-5374DB7677F2}"/>
+              </a:ext>
+            </a:extLst>
+          </p:cNvPr>
+          <p:cNvPicPr>
+            <a:picLocks noChangeAspect="1" noChangeArrowheads="1"/>
+          </p:cNvPicPr>
+          <p:nvPr/>
+        </p:nvPicPr>
+        <p:blipFill>
+          <a:blip r:embed="rId2">
+            <a:extLst>
+              <a:ext uri="{28A0092B-C50C-407E-A947-70E740481C1C}">
+                <a14:useLocalDpi xmlns:a14="http://schemas.microsoft.com/office/drawing/2010/main" val="0"/>
+              </a:ext>
+            </a:extLst>
+          </a:blip>
+          <a:srcRect/>
+          <a:stretch>
+            <a:fillRect/>
+          </a:stretch>
+        </p:blipFill>
+        <p:spPr bwMode="auto">
+          <a:xfrm>
+            <a:off x="602411" y="2537845"/>
+            <a:ext cx="607429" cy="1124958"/>
+          </a:xfrm>
+          <a:prstGeom prst="rect">
+            <a:avLst/>
+          </a:prstGeom>
+          <a:noFill/>
+          <a:extLst>
+            <a:ext uri="{909E8E84-426E-40DD-AFC4-6F175D3DCCD1}">
+              <a14:hiddenFill xmlns:a14="http://schemas.microsoft.com/office/drawing/2010/main">
+                <a:solidFill>
+                  <a:srgbClr val="FFFFFF"/>
+                </a:solidFill>
+              </a14:hiddenFill>
+            </a:ext>
+          </a:extLst>
+        </p:spPr>
+      </p:pic>
+      <p:pic>
+        <p:nvPicPr>
+          <p:cNvPr id="5" name="Picture 2" descr="Stick figure - Wikipedia">
+            <a:extLst>
+              <a:ext uri="{FF2B5EF4-FFF2-40B4-BE49-F238E27FC236}">
+                <a16:creationId xmlns:a16="http://schemas.microsoft.com/office/drawing/2014/main" id="{4B84EB53-84D2-4868-8F1A-9DF854A5CAB7}"/>
+              </a:ext>
+            </a:extLst>
+          </p:cNvPr>
+          <p:cNvPicPr>
+            <a:picLocks noChangeAspect="1" noChangeArrowheads="1"/>
+          </p:cNvPicPr>
+          <p:nvPr/>
+        </p:nvPicPr>
+        <p:blipFill>
+          <a:blip r:embed="rId2">
+            <a:extLst>
+              <a:ext uri="{28A0092B-C50C-407E-A947-70E740481C1C}">
+                <a14:useLocalDpi xmlns:a14="http://schemas.microsoft.com/office/drawing/2010/main" val="0"/>
+              </a:ext>
+            </a:extLst>
+          </a:blip>
+          <a:srcRect/>
+          <a:stretch>
+            <a:fillRect/>
+          </a:stretch>
+        </p:blipFill>
+        <p:spPr bwMode="auto">
+          <a:xfrm>
+            <a:off x="8945798" y="1975366"/>
+            <a:ext cx="607429" cy="1124958"/>
+          </a:xfrm>
+          <a:prstGeom prst="rect">
+            <a:avLst/>
+          </a:prstGeom>
+          <a:noFill/>
+          <a:extLst>
+            <a:ext uri="{909E8E84-426E-40DD-AFC4-6F175D3DCCD1}">
+              <a14:hiddenFill xmlns:a14="http://schemas.microsoft.com/office/drawing/2010/main">
+                <a:solidFill>
+                  <a:srgbClr val="FFFFFF"/>
+                </a:solidFill>
+              </a14:hiddenFill>
+            </a:ext>
+          </a:extLst>
+        </p:spPr>
+      </p:pic>
+      <p:sp>
+        <p:nvSpPr>
+          <p:cNvPr id="6" name="Elipse 5">
+            <a:extLst>
+              <a:ext uri="{FF2B5EF4-FFF2-40B4-BE49-F238E27FC236}">
+                <a16:creationId xmlns:a16="http://schemas.microsoft.com/office/drawing/2014/main" id="{14A9BB60-D8C6-4E9B-8976-5070A99E3D90}"/>
+              </a:ext>
+            </a:extLst>
+          </p:cNvPr>
+          <p:cNvSpPr/>
+          <p:nvPr/>
+        </p:nvSpPr>
+        <p:spPr>
+          <a:xfrm>
+            <a:off x="3628104" y="752168"/>
+            <a:ext cx="2595716" cy="1124958"/>
+          </a:xfrm>
+          <a:prstGeom prst="ellipse">
+            <a:avLst/>
+          </a:prstGeom>
+        </p:spPr>
+        <p:style>
+          <a:lnRef idx="2">
+            <a:schemeClr val="accent1">
+              <a:shade val="50000"/>
+            </a:schemeClr>
+          </a:lnRef>
+          <a:fillRef idx="1">
+            <a:schemeClr val="accent1"/>
+          </a:fillRef>
+          <a:effectRef idx="0">
+            <a:schemeClr val="accent1"/>
+          </a:effectRef>
+          <a:fontRef idx="minor">
+            <a:schemeClr val="lt1"/>
+          </a:fontRef>
+        </p:style>
+        <p:txBody>
+          <a:bodyPr rtlCol="0" anchor="ctr"/>
+          <a:lstStyle/>
+          <a:p>
+            <a:pPr algn="ctr"/>
+            <a:r>
+              <a:rPr lang="pt-BR" dirty="0"/>
+              <a:t>Autenticar no </a:t>
+            </a:r>
+          </a:p>
+          <a:p>
+            <a:pPr algn="ctr"/>
+            <a:r>
+              <a:rPr lang="pt-BR" dirty="0"/>
+              <a:t>Sistema</a:t>
+            </a:r>
+          </a:p>
+        </p:txBody>
+      </p:sp>
+      <p:sp>
+        <p:nvSpPr>
+          <p:cNvPr id="7" name="Elipse 6">
+            <a:extLst>
+              <a:ext uri="{FF2B5EF4-FFF2-40B4-BE49-F238E27FC236}">
+                <a16:creationId xmlns:a16="http://schemas.microsoft.com/office/drawing/2014/main" id="{7B08EBEB-A871-488A-A1FC-B2A61ECA847F}"/>
+              </a:ext>
+            </a:extLst>
+          </p:cNvPr>
+          <p:cNvSpPr/>
+          <p:nvPr/>
+        </p:nvSpPr>
+        <p:spPr>
+          <a:xfrm>
+            <a:off x="3628104" y="1975366"/>
+            <a:ext cx="2595716" cy="1124958"/>
+          </a:xfrm>
+          <a:prstGeom prst="ellipse">
+            <a:avLst/>
+          </a:prstGeom>
+        </p:spPr>
+        <p:style>
+          <a:lnRef idx="2">
+            <a:schemeClr val="accent1">
+              <a:shade val="50000"/>
+            </a:schemeClr>
+          </a:lnRef>
+          <a:fillRef idx="1">
+            <a:schemeClr val="accent1"/>
+          </a:fillRef>
+          <a:effectRef idx="0">
+            <a:schemeClr val="accent1"/>
+          </a:effectRef>
+          <a:fontRef idx="minor">
+            <a:schemeClr val="lt1"/>
+          </a:fontRef>
+        </p:style>
+        <p:txBody>
+          <a:bodyPr rtlCol="0" anchor="ctr"/>
+          <a:lstStyle/>
+          <a:p>
+            <a:pPr algn="ctr"/>
+            <a:r>
+              <a:rPr lang="pt-BR" dirty="0"/>
+              <a:t>Agendar Manutenção</a:t>
+            </a:r>
+          </a:p>
+        </p:txBody>
+      </p:sp>
+      <p:sp>
+        <p:nvSpPr>
+          <p:cNvPr id="8" name="Elipse 7">
+            <a:extLst>
+              <a:ext uri="{FF2B5EF4-FFF2-40B4-BE49-F238E27FC236}">
+                <a16:creationId xmlns:a16="http://schemas.microsoft.com/office/drawing/2014/main" id="{8F4F6CCC-3745-4933-BE59-01DEC4D6FC2D}"/>
+              </a:ext>
+            </a:extLst>
+          </p:cNvPr>
+          <p:cNvSpPr/>
+          <p:nvPr/>
+        </p:nvSpPr>
+        <p:spPr>
+          <a:xfrm>
+            <a:off x="3628104" y="3260720"/>
+            <a:ext cx="2595716" cy="1124958"/>
+          </a:xfrm>
+          <a:prstGeom prst="ellipse">
+            <a:avLst/>
+          </a:prstGeom>
+        </p:spPr>
+        <p:style>
+          <a:lnRef idx="2">
+            <a:schemeClr val="accent1">
+              <a:shade val="50000"/>
+            </a:schemeClr>
+          </a:lnRef>
+          <a:fillRef idx="1">
+            <a:schemeClr val="accent1"/>
+          </a:fillRef>
+          <a:effectRef idx="0">
+            <a:schemeClr val="accent1"/>
+          </a:effectRef>
+          <a:fontRef idx="minor">
+            <a:schemeClr val="lt1"/>
+          </a:fontRef>
+        </p:style>
+        <p:txBody>
+          <a:bodyPr rtlCol="0" anchor="ctr"/>
+          <a:lstStyle/>
+          <a:p>
+            <a:pPr algn="ctr"/>
+            <a:r>
+              <a:rPr lang="pt-BR" dirty="0"/>
+              <a:t>Atribuir Técnico á </a:t>
+            </a:r>
+          </a:p>
+          <a:p>
+            <a:pPr algn="ctr"/>
+            <a:r>
+              <a:rPr lang="pt-BR" dirty="0"/>
+              <a:t>Manutenção</a:t>
+            </a:r>
+          </a:p>
+        </p:txBody>
+      </p:sp>
+      <p:sp>
+        <p:nvSpPr>
+          <p:cNvPr id="9" name="Elipse 8">
+            <a:extLst>
+              <a:ext uri="{FF2B5EF4-FFF2-40B4-BE49-F238E27FC236}">
+                <a16:creationId xmlns:a16="http://schemas.microsoft.com/office/drawing/2014/main" id="{9DEF88EE-08E1-443F-8258-B0665B126999}"/>
+              </a:ext>
+            </a:extLst>
+          </p:cNvPr>
+          <p:cNvSpPr/>
+          <p:nvPr/>
+        </p:nvSpPr>
+        <p:spPr>
+          <a:xfrm>
+            <a:off x="3628104" y="4546074"/>
+            <a:ext cx="2595716" cy="1124958"/>
+          </a:xfrm>
+          <a:prstGeom prst="ellipse">
+            <a:avLst/>
+          </a:prstGeom>
+        </p:spPr>
+        <p:style>
+          <a:lnRef idx="2">
+            <a:schemeClr val="accent1">
+              <a:shade val="50000"/>
+            </a:schemeClr>
+          </a:lnRef>
+          <a:fillRef idx="1">
+            <a:schemeClr val="accent1"/>
+          </a:fillRef>
+          <a:effectRef idx="0">
+            <a:schemeClr val="accent1"/>
+          </a:effectRef>
+          <a:fontRef idx="minor">
+            <a:schemeClr val="lt1"/>
+          </a:fontRef>
+        </p:style>
+        <p:txBody>
+          <a:bodyPr rtlCol="0" anchor="ctr"/>
+          <a:lstStyle/>
+          <a:p>
+            <a:pPr algn="ctr"/>
+            <a:r>
+              <a:rPr lang="pt-BR" dirty="0"/>
+              <a:t>Visualizar Agenda </a:t>
+            </a:r>
+          </a:p>
+          <a:p>
+            <a:pPr algn="ctr"/>
+            <a:r>
+              <a:rPr lang="pt-BR" dirty="0"/>
+              <a:t>Manutenção</a:t>
+            </a:r>
+          </a:p>
+        </p:txBody>
+      </p:sp>
+      <p:sp>
+        <p:nvSpPr>
+          <p:cNvPr id="10" name="CaixaDeTexto 9">
+            <a:extLst>
+              <a:ext uri="{FF2B5EF4-FFF2-40B4-BE49-F238E27FC236}">
+                <a16:creationId xmlns:a16="http://schemas.microsoft.com/office/drawing/2014/main" id="{813D0806-9F67-4C28-A64F-E4BF30D716E1}"/>
+              </a:ext>
+            </a:extLst>
+          </p:cNvPr>
+          <p:cNvSpPr txBox="1"/>
+          <p:nvPr/>
+        </p:nvSpPr>
+        <p:spPr>
+          <a:xfrm>
+            <a:off x="501206" y="3478137"/>
+            <a:ext cx="809837" cy="369332"/>
+          </a:xfrm>
+          <a:prstGeom prst="rect">
+            <a:avLst/>
+          </a:prstGeom>
+          <a:noFill/>
+        </p:spPr>
+        <p:txBody>
+          <a:bodyPr wrap="square" rtlCol="0">
+            <a:spAutoFit/>
+          </a:bodyPr>
+          <a:lstStyle/>
+          <a:p>
+            <a:r>
+              <a:rPr lang="pt-BR" dirty="0"/>
+              <a:t>Gestor</a:t>
+            </a:r>
+          </a:p>
+        </p:txBody>
+      </p:sp>
+      <p:sp>
+        <p:nvSpPr>
+          <p:cNvPr id="11" name="CaixaDeTexto 10">
+            <a:extLst>
+              <a:ext uri="{FF2B5EF4-FFF2-40B4-BE49-F238E27FC236}">
+                <a16:creationId xmlns:a16="http://schemas.microsoft.com/office/drawing/2014/main" id="{87D836DF-FCA0-46E1-9B9C-15551B7AB59E}"/>
+              </a:ext>
+            </a:extLst>
+          </p:cNvPr>
+          <p:cNvSpPr txBox="1"/>
+          <p:nvPr/>
+        </p:nvSpPr>
+        <p:spPr>
+          <a:xfrm>
+            <a:off x="8808525" y="3059668"/>
+            <a:ext cx="881973" cy="369332"/>
+          </a:xfrm>
+          <a:prstGeom prst="rect">
+            <a:avLst/>
+          </a:prstGeom>
+          <a:noFill/>
+        </p:spPr>
+        <p:txBody>
+          <a:bodyPr wrap="none" rtlCol="0">
+            <a:spAutoFit/>
+          </a:bodyPr>
+          <a:lstStyle/>
+          <a:p>
+            <a:r>
+              <a:rPr lang="pt-BR" dirty="0"/>
+              <a:t>Técnico</a:t>
+            </a:r>
+          </a:p>
+        </p:txBody>
+      </p:sp>
+      <p:cxnSp>
+        <p:nvCxnSpPr>
+          <p:cNvPr id="13" name="Conector de Seta Reta 12">
+            <a:extLst>
+              <a:ext uri="{FF2B5EF4-FFF2-40B4-BE49-F238E27FC236}">
+                <a16:creationId xmlns:a16="http://schemas.microsoft.com/office/drawing/2014/main" id="{22EDA1BA-612C-4457-8030-9AD2A3C9224E}"/>
+              </a:ext>
+            </a:extLst>
+          </p:cNvPr>
+          <p:cNvCxnSpPr>
+            <a:cxnSpLocks/>
+            <a:stCxn id="4" idx="3"/>
+            <a:endCxn id="6" idx="2"/>
+          </p:cNvCxnSpPr>
+          <p:nvPr/>
+        </p:nvCxnSpPr>
+        <p:spPr>
+          <a:xfrm flipV="1">
+            <a:off x="1209840" y="1314647"/>
+            <a:ext cx="2418264" cy="1785677"/>
+          </a:xfrm>
+          <a:prstGeom prst="straightConnector1">
+            <a:avLst/>
+          </a:prstGeom>
+          <a:ln>
+            <a:tailEnd type="triangle"/>
+          </a:ln>
+        </p:spPr>
+        <p:style>
+          <a:lnRef idx="1">
+            <a:schemeClr val="accent1"/>
+          </a:lnRef>
+          <a:fillRef idx="0">
+            <a:schemeClr val="accent1"/>
+          </a:fillRef>
+          <a:effectRef idx="0">
+            <a:schemeClr val="accent1"/>
+          </a:effectRef>
+          <a:fontRef idx="minor">
+            <a:schemeClr val="tx1"/>
+          </a:fontRef>
+        </p:style>
+      </p:cxnSp>
+      <p:cxnSp>
+        <p:nvCxnSpPr>
+          <p:cNvPr id="16" name="Conector de Seta Reta 15">
+            <a:extLst>
+              <a:ext uri="{FF2B5EF4-FFF2-40B4-BE49-F238E27FC236}">
+                <a16:creationId xmlns:a16="http://schemas.microsoft.com/office/drawing/2014/main" id="{91A113E2-39B8-4525-B2B3-A5A06871CBFD}"/>
+              </a:ext>
+            </a:extLst>
+          </p:cNvPr>
+          <p:cNvCxnSpPr>
+            <a:cxnSpLocks/>
+            <a:stCxn id="4" idx="3"/>
+            <a:endCxn id="7" idx="2"/>
+          </p:cNvCxnSpPr>
+          <p:nvPr/>
+        </p:nvCxnSpPr>
+        <p:spPr>
+          <a:xfrm flipV="1">
+            <a:off x="1209840" y="2537845"/>
+            <a:ext cx="2418264" cy="562479"/>
+          </a:xfrm>
+          <a:prstGeom prst="straightConnector1">
+            <a:avLst/>
+          </a:prstGeom>
+          <a:ln>
+            <a:tailEnd type="triangle"/>
+          </a:ln>
+        </p:spPr>
+        <p:style>
+          <a:lnRef idx="1">
+            <a:schemeClr val="accent1"/>
+          </a:lnRef>
+          <a:fillRef idx="0">
+            <a:schemeClr val="accent1"/>
+          </a:fillRef>
+          <a:effectRef idx="0">
+            <a:schemeClr val="accent1"/>
+          </a:effectRef>
+          <a:fontRef idx="minor">
+            <a:schemeClr val="tx1"/>
+          </a:fontRef>
+        </p:style>
+      </p:cxnSp>
+      <p:cxnSp>
+        <p:nvCxnSpPr>
+          <p:cNvPr id="17" name="Conector de Seta Reta 16">
+            <a:extLst>
+              <a:ext uri="{FF2B5EF4-FFF2-40B4-BE49-F238E27FC236}">
+                <a16:creationId xmlns:a16="http://schemas.microsoft.com/office/drawing/2014/main" id="{40B8B77A-E99A-418D-A2CD-EF0E8B68756D}"/>
+              </a:ext>
+            </a:extLst>
+          </p:cNvPr>
+          <p:cNvCxnSpPr>
+            <a:cxnSpLocks/>
+            <a:stCxn id="4" idx="3"/>
+            <a:endCxn id="8" idx="2"/>
+          </p:cNvCxnSpPr>
+          <p:nvPr/>
+        </p:nvCxnSpPr>
+        <p:spPr>
+          <a:xfrm>
+            <a:off x="1209840" y="3100324"/>
+            <a:ext cx="2418264" cy="722875"/>
+          </a:xfrm>
+          <a:prstGeom prst="straightConnector1">
+            <a:avLst/>
+          </a:prstGeom>
+          <a:ln>
+            <a:tailEnd type="triangle"/>
+          </a:ln>
+        </p:spPr>
+        <p:style>
+          <a:lnRef idx="1">
+            <a:schemeClr val="accent1"/>
+          </a:lnRef>
+          <a:fillRef idx="0">
+            <a:schemeClr val="accent1"/>
+          </a:fillRef>
+          <a:effectRef idx="0">
+            <a:schemeClr val="accent1"/>
+          </a:effectRef>
+          <a:fontRef idx="minor">
+            <a:schemeClr val="tx1"/>
+          </a:fontRef>
+        </p:style>
+      </p:cxnSp>
+      <p:cxnSp>
+        <p:nvCxnSpPr>
+          <p:cNvPr id="18" name="Conector de Seta Reta 17">
+            <a:extLst>
+              <a:ext uri="{FF2B5EF4-FFF2-40B4-BE49-F238E27FC236}">
+                <a16:creationId xmlns:a16="http://schemas.microsoft.com/office/drawing/2014/main" id="{B1B9F5E2-AB13-489C-B593-F4B30D58AE2B}"/>
+              </a:ext>
+            </a:extLst>
+          </p:cNvPr>
+          <p:cNvCxnSpPr>
+            <a:cxnSpLocks/>
+            <a:stCxn id="4" idx="3"/>
+            <a:endCxn id="9" idx="2"/>
+          </p:cNvCxnSpPr>
+          <p:nvPr/>
+        </p:nvCxnSpPr>
+        <p:spPr>
+          <a:xfrm>
+            <a:off x="1209840" y="3100324"/>
+            <a:ext cx="2418264" cy="2008229"/>
+          </a:xfrm>
+          <a:prstGeom prst="straightConnector1">
+            <a:avLst/>
+          </a:prstGeom>
+          <a:ln>
+            <a:tailEnd type="triangle"/>
+          </a:ln>
+        </p:spPr>
+        <p:style>
+          <a:lnRef idx="1">
+            <a:schemeClr val="accent1"/>
+          </a:lnRef>
+          <a:fillRef idx="0">
+            <a:schemeClr val="accent1"/>
+          </a:fillRef>
+          <a:effectRef idx="0">
+            <a:schemeClr val="accent1"/>
+          </a:effectRef>
+          <a:fontRef idx="minor">
+            <a:schemeClr val="tx1"/>
+          </a:fontRef>
+        </p:style>
+      </p:cxnSp>
+      <p:cxnSp>
+        <p:nvCxnSpPr>
+          <p:cNvPr id="27" name="Conector de Seta Reta 26">
+            <a:extLst>
+              <a:ext uri="{FF2B5EF4-FFF2-40B4-BE49-F238E27FC236}">
+                <a16:creationId xmlns:a16="http://schemas.microsoft.com/office/drawing/2014/main" id="{C7EF2252-2348-48B1-BDD7-7D94BA2E8BDC}"/>
+              </a:ext>
+            </a:extLst>
+          </p:cNvPr>
+          <p:cNvCxnSpPr>
+            <a:cxnSpLocks/>
+            <a:stCxn id="5" idx="1"/>
+            <a:endCxn id="6" idx="6"/>
+          </p:cNvCxnSpPr>
+          <p:nvPr/>
+        </p:nvCxnSpPr>
+        <p:spPr>
+          <a:xfrm flipH="1" flipV="1">
+            <a:off x="6223820" y="1314647"/>
+            <a:ext cx="2721978" cy="1223198"/>
+          </a:xfrm>
+          <a:prstGeom prst="straightConnector1">
+            <a:avLst/>
+          </a:prstGeom>
+          <a:ln>
+            <a:tailEnd type="triangle"/>
+          </a:ln>
+        </p:spPr>
+        <p:style>
+          <a:lnRef idx="1">
+            <a:schemeClr val="accent1"/>
+          </a:lnRef>
+          <a:fillRef idx="0">
+            <a:schemeClr val="accent1"/>
+          </a:fillRef>
+          <a:effectRef idx="0">
+            <a:schemeClr val="accent1"/>
+          </a:effectRef>
+          <a:fontRef idx="minor">
+            <a:schemeClr val="tx1"/>
+          </a:fontRef>
+        </p:style>
+      </p:cxnSp>
+      <p:cxnSp>
+        <p:nvCxnSpPr>
+          <p:cNvPr id="28" name="Conector de Seta Reta 27">
+            <a:extLst>
+              <a:ext uri="{FF2B5EF4-FFF2-40B4-BE49-F238E27FC236}">
+                <a16:creationId xmlns:a16="http://schemas.microsoft.com/office/drawing/2014/main" id="{B667EECC-5A47-444B-83F3-AD28E7061846}"/>
+              </a:ext>
+            </a:extLst>
+          </p:cNvPr>
+          <p:cNvCxnSpPr>
+            <a:cxnSpLocks/>
+            <a:stCxn id="5" idx="1"/>
+            <a:endCxn id="9" idx="6"/>
+          </p:cNvCxnSpPr>
+          <p:nvPr/>
+        </p:nvCxnSpPr>
+        <p:spPr>
+          <a:xfrm flipH="1">
+            <a:off x="6223820" y="2537845"/>
+            <a:ext cx="2721978" cy="2570708"/>
+          </a:xfrm>
+          <a:prstGeom prst="straightConnector1">
+            <a:avLst/>
+          </a:prstGeom>
+          <a:ln>
+            <a:tailEnd type="triangle"/>
+          </a:ln>
+        </p:spPr>
+        <p:style>
+          <a:lnRef idx="1">
+            <a:schemeClr val="accent1"/>
+          </a:lnRef>
+          <a:fillRef idx="0">
+            <a:schemeClr val="accent1"/>
+          </a:fillRef>
+          <a:effectRef idx="0">
+            <a:schemeClr val="accent1"/>
+          </a:effectRef>
+          <a:fontRef idx="minor">
+            <a:schemeClr val="tx1"/>
+          </a:fontRef>
+        </p:style>
+      </p:cxnSp>
+      <p:sp>
+        <p:nvSpPr>
+          <p:cNvPr id="34" name="CaixaDeTexto 33">
+            <a:extLst>
+              <a:ext uri="{FF2B5EF4-FFF2-40B4-BE49-F238E27FC236}">
+                <a16:creationId xmlns:a16="http://schemas.microsoft.com/office/drawing/2014/main" id="{FE395D1A-E721-4C10-BF0E-19EA86491116}"/>
+              </a:ext>
+            </a:extLst>
+          </p:cNvPr>
+          <p:cNvSpPr txBox="1"/>
+          <p:nvPr/>
+        </p:nvSpPr>
+        <p:spPr>
+          <a:xfrm>
+            <a:off x="145211" y="117972"/>
+            <a:ext cx="4232954" cy="369332"/>
+          </a:xfrm>
+          <a:prstGeom prst="rect">
+            <a:avLst/>
+          </a:prstGeom>
+          <a:noFill/>
+        </p:spPr>
+        <p:txBody>
+          <a:bodyPr wrap="none" rtlCol="0">
+            <a:spAutoFit/>
+          </a:bodyPr>
+          <a:lstStyle/>
+          <a:p>
+            <a:pPr marL="285750" indent="-285750">
+              <a:buFont typeface="Wingdings" panose="05000000000000000000" pitchFamily="2" charset="2"/>
+              <a:buChar char="Ø"/>
+            </a:pPr>
+            <a:r>
+              <a:rPr lang="pt-BR" dirty="0"/>
+              <a:t>Permitir Agendamentos de Manutenção</a:t>
+            </a:r>
+          </a:p>
+        </p:txBody>
+      </p:sp>
+    </p:spTree>
+    <p:extLst>
+      <p:ext uri="{BB962C8B-B14F-4D97-AF65-F5344CB8AC3E}">
+        <p14:creationId xmlns:p14="http://schemas.microsoft.com/office/powerpoint/2010/main" val="4207231550"/>
+      </p:ext>
+    </p:extLst>
+  </p:cSld>
+  <p:clrMapOvr>
+    <a:masterClrMapping/>
+  </p:clrMapOvr>
+</p:sld>
+</file>
+
+<file path=ppt/slides/slide6.xml><?xml version="1.0" encoding="utf-8"?>
+<p:sld xmlns:a="http://schemas.openxmlformats.org/drawingml/2006/main" xmlns:r="http://schemas.openxmlformats.org/officeDocument/2006/relationships" xmlns:p="http://schemas.openxmlformats.org/presentationml/2006/main">
+  <p:cSld>
+    <p:spTree>
+      <p:nvGrpSpPr>
+        <p:cNvPr id="1" name=""/>
+        <p:cNvGrpSpPr/>
+        <p:nvPr/>
+      </p:nvGrpSpPr>
+      <p:grpSpPr>
+        <a:xfrm>
+          <a:off x="0" y="0"/>
+          <a:ext cx="0" cy="0"/>
+          <a:chOff x="0" y="0"/>
+          <a:chExt cx="0" cy="0"/>
+        </a:xfrm>
+      </p:grpSpPr>
+      <p:sp>
+        <p:nvSpPr>
+          <p:cNvPr id="4" name="CaixaDeTexto 3">
+            <a:extLst>
+              <a:ext uri="{FF2B5EF4-FFF2-40B4-BE49-F238E27FC236}">
+                <a16:creationId xmlns:a16="http://schemas.microsoft.com/office/drawing/2014/main" id="{71C4F9EA-FD1D-484C-829F-CC71D517910A}"/>
+              </a:ext>
+            </a:extLst>
+          </p:cNvPr>
+          <p:cNvSpPr txBox="1"/>
+          <p:nvPr/>
+        </p:nvSpPr>
+        <p:spPr>
+          <a:xfrm>
+            <a:off x="117986" y="176980"/>
+            <a:ext cx="3465949" cy="369332"/>
+          </a:xfrm>
+          <a:prstGeom prst="rect">
+            <a:avLst/>
+          </a:prstGeom>
+          <a:noFill/>
+        </p:spPr>
+        <p:txBody>
+          <a:bodyPr wrap="none" rtlCol="0">
+            <a:spAutoFit/>
+          </a:bodyPr>
+          <a:lstStyle/>
+          <a:p>
+            <a:pPr marL="285750" indent="-285750">
+              <a:buFont typeface="Wingdings" panose="05000000000000000000" pitchFamily="2" charset="2"/>
+              <a:buChar char="Ø"/>
+            </a:pPr>
+            <a:r>
+              <a:rPr lang="pt-BR" dirty="0"/>
+              <a:t>Implementar painel de métricas</a:t>
+            </a:r>
+          </a:p>
+        </p:txBody>
+      </p:sp>
+      <p:pic>
+        <p:nvPicPr>
+          <p:cNvPr id="5" name="Picture 2" descr="Stick figure - Wikipedia">
+            <a:extLst>
+              <a:ext uri="{FF2B5EF4-FFF2-40B4-BE49-F238E27FC236}">
+                <a16:creationId xmlns:a16="http://schemas.microsoft.com/office/drawing/2014/main" id="{793162C9-EE9F-4D1D-BBD2-A175C4B05455}"/>
+              </a:ext>
+            </a:extLst>
+          </p:cNvPr>
+          <p:cNvPicPr>
+            <a:picLocks noChangeAspect="1" noChangeArrowheads="1"/>
+          </p:cNvPicPr>
+          <p:nvPr/>
+        </p:nvPicPr>
+        <p:blipFill>
+          <a:blip r:embed="rId2">
+            <a:extLst>
+              <a:ext uri="{28A0092B-C50C-407E-A947-70E740481C1C}">
+                <a14:useLocalDpi xmlns:a14="http://schemas.microsoft.com/office/drawing/2010/main" val="0"/>
+              </a:ext>
+            </a:extLst>
+          </a:blip>
+          <a:srcRect/>
+          <a:stretch>
+            <a:fillRect/>
+          </a:stretch>
+        </p:blipFill>
+        <p:spPr bwMode="auto">
+          <a:xfrm>
+            <a:off x="617157" y="2401727"/>
+            <a:ext cx="607429" cy="1124958"/>
+          </a:xfrm>
+          <a:prstGeom prst="rect">
+            <a:avLst/>
+          </a:prstGeom>
+          <a:noFill/>
+          <a:extLst>
+            <a:ext uri="{909E8E84-426E-40DD-AFC4-6F175D3DCCD1}">
+              <a14:hiddenFill xmlns:a14="http://schemas.microsoft.com/office/drawing/2010/main">
+                <a:solidFill>
+                  <a:srgbClr val="FFFFFF"/>
+                </a:solidFill>
+              </a14:hiddenFill>
+            </a:ext>
+          </a:extLst>
+        </p:spPr>
+      </p:pic>
+      <p:sp>
+        <p:nvSpPr>
+          <p:cNvPr id="6" name="CaixaDeTexto 5">
+            <a:extLst>
+              <a:ext uri="{FF2B5EF4-FFF2-40B4-BE49-F238E27FC236}">
+                <a16:creationId xmlns:a16="http://schemas.microsoft.com/office/drawing/2014/main" id="{2BD3B5CE-55E0-42E5-8A89-A0F00C30DB74}"/>
+              </a:ext>
+            </a:extLst>
+          </p:cNvPr>
+          <p:cNvSpPr txBox="1"/>
+          <p:nvPr/>
+        </p:nvSpPr>
+        <p:spPr>
+          <a:xfrm>
+            <a:off x="515952" y="3429000"/>
+            <a:ext cx="809837" cy="369332"/>
+          </a:xfrm>
+          <a:prstGeom prst="rect">
+            <a:avLst/>
+          </a:prstGeom>
+          <a:noFill/>
+        </p:spPr>
+        <p:txBody>
+          <a:bodyPr wrap="none" rtlCol="0">
+            <a:spAutoFit/>
+          </a:bodyPr>
+          <a:lstStyle/>
+          <a:p>
+            <a:r>
+              <a:rPr lang="pt-BR" dirty="0"/>
+              <a:t>Gestor</a:t>
+            </a:r>
+          </a:p>
+        </p:txBody>
+      </p:sp>
+      <p:sp>
+        <p:nvSpPr>
+          <p:cNvPr id="7" name="Elipse 6">
+            <a:extLst>
+              <a:ext uri="{FF2B5EF4-FFF2-40B4-BE49-F238E27FC236}">
+                <a16:creationId xmlns:a16="http://schemas.microsoft.com/office/drawing/2014/main" id="{D6CD3D25-E9E7-4022-A6CA-34ED7EE76154}"/>
+              </a:ext>
+            </a:extLst>
+          </p:cNvPr>
+          <p:cNvSpPr/>
+          <p:nvPr/>
+        </p:nvSpPr>
+        <p:spPr>
+          <a:xfrm>
+            <a:off x="3746090" y="1047135"/>
+            <a:ext cx="2349910" cy="1061884"/>
+          </a:xfrm>
+          <a:prstGeom prst="ellipse">
+            <a:avLst/>
+          </a:prstGeom>
+        </p:spPr>
+        <p:style>
+          <a:lnRef idx="2">
+            <a:schemeClr val="accent1">
+              <a:shade val="50000"/>
+            </a:schemeClr>
+          </a:lnRef>
+          <a:fillRef idx="1">
+            <a:schemeClr val="accent1"/>
+          </a:fillRef>
+          <a:effectRef idx="0">
+            <a:schemeClr val="accent1"/>
+          </a:effectRef>
+          <a:fontRef idx="minor">
+            <a:schemeClr val="lt1"/>
+          </a:fontRef>
+        </p:style>
+        <p:txBody>
+          <a:bodyPr rtlCol="0" anchor="ctr"/>
+          <a:lstStyle/>
+          <a:p>
+            <a:pPr algn="ctr"/>
+            <a:r>
+              <a:rPr lang="pt-BR" dirty="0"/>
+              <a:t>Autenticar no Sistema</a:t>
+            </a:r>
+          </a:p>
+        </p:txBody>
+      </p:sp>
+      <p:sp>
+        <p:nvSpPr>
+          <p:cNvPr id="8" name="Elipse 7">
+            <a:extLst>
+              <a:ext uri="{FF2B5EF4-FFF2-40B4-BE49-F238E27FC236}">
+                <a16:creationId xmlns:a16="http://schemas.microsoft.com/office/drawing/2014/main" id="{D719C244-2209-4BB5-9E03-1F09767AEC8E}"/>
+              </a:ext>
+            </a:extLst>
+          </p:cNvPr>
+          <p:cNvSpPr/>
+          <p:nvPr/>
+        </p:nvSpPr>
+        <p:spPr>
+          <a:xfrm>
+            <a:off x="3746090" y="2241754"/>
+            <a:ext cx="2349910" cy="1061884"/>
+          </a:xfrm>
+          <a:prstGeom prst="ellipse">
+            <a:avLst/>
+          </a:prstGeom>
+        </p:spPr>
+        <p:style>
+          <a:lnRef idx="2">
+            <a:schemeClr val="accent1">
+              <a:shade val="50000"/>
+            </a:schemeClr>
+          </a:lnRef>
+          <a:fillRef idx="1">
+            <a:schemeClr val="accent1"/>
+          </a:fillRef>
+          <a:effectRef idx="0">
+            <a:schemeClr val="accent1"/>
+          </a:effectRef>
+          <a:fontRef idx="minor">
+            <a:schemeClr val="lt1"/>
+          </a:fontRef>
+        </p:style>
+        <p:txBody>
+          <a:bodyPr rtlCol="0" anchor="ctr"/>
+          <a:lstStyle/>
+          <a:p>
+            <a:pPr algn="ctr"/>
+            <a:r>
+              <a:rPr lang="pt-BR" dirty="0"/>
+              <a:t>Visualizar Painel de </a:t>
+            </a:r>
+          </a:p>
+          <a:p>
+            <a:pPr algn="ctr"/>
+            <a:r>
+              <a:rPr lang="pt-BR" dirty="0"/>
+              <a:t>KPIs</a:t>
+            </a:r>
+          </a:p>
+        </p:txBody>
+      </p:sp>
+      <p:sp>
+        <p:nvSpPr>
+          <p:cNvPr id="9" name="Elipse 8">
+            <a:extLst>
+              <a:ext uri="{FF2B5EF4-FFF2-40B4-BE49-F238E27FC236}">
+                <a16:creationId xmlns:a16="http://schemas.microsoft.com/office/drawing/2014/main" id="{F99909EC-51AD-41BC-9328-052BA1AE2AA4}"/>
+              </a:ext>
+            </a:extLst>
+          </p:cNvPr>
+          <p:cNvSpPr/>
+          <p:nvPr/>
+        </p:nvSpPr>
+        <p:spPr>
+          <a:xfrm>
+            <a:off x="3746090" y="3436373"/>
+            <a:ext cx="2349910" cy="1061884"/>
+          </a:xfrm>
+          <a:prstGeom prst="ellipse">
+            <a:avLst/>
+          </a:prstGeom>
+        </p:spPr>
+        <p:style>
+          <a:lnRef idx="2">
+            <a:schemeClr val="accent1">
+              <a:shade val="50000"/>
+            </a:schemeClr>
+          </a:lnRef>
+          <a:fillRef idx="1">
+            <a:schemeClr val="accent1"/>
+          </a:fillRef>
+          <a:effectRef idx="0">
+            <a:schemeClr val="accent1"/>
+          </a:effectRef>
+          <a:fontRef idx="minor">
+            <a:schemeClr val="lt1"/>
+          </a:fontRef>
+        </p:style>
+        <p:txBody>
+          <a:bodyPr rtlCol="0" anchor="ctr"/>
+          <a:lstStyle/>
+          <a:p>
+            <a:pPr algn="ctr"/>
+            <a:r>
+              <a:rPr lang="pt-BR" dirty="0"/>
+              <a:t>Filtrar métricas</a:t>
+            </a:r>
+          </a:p>
+        </p:txBody>
+      </p:sp>
+      <p:sp>
+        <p:nvSpPr>
+          <p:cNvPr id="10" name="Elipse 9">
+            <a:extLst>
+              <a:ext uri="{FF2B5EF4-FFF2-40B4-BE49-F238E27FC236}">
+                <a16:creationId xmlns:a16="http://schemas.microsoft.com/office/drawing/2014/main" id="{88AD32DD-5E6C-485C-8D81-7720F9ED0D86}"/>
+              </a:ext>
+            </a:extLst>
+          </p:cNvPr>
+          <p:cNvSpPr/>
+          <p:nvPr/>
+        </p:nvSpPr>
+        <p:spPr>
+          <a:xfrm>
+            <a:off x="3785419" y="4748981"/>
+            <a:ext cx="2349910" cy="1061884"/>
+          </a:xfrm>
+          <a:prstGeom prst="ellipse">
+            <a:avLst/>
+          </a:prstGeom>
+        </p:spPr>
+        <p:style>
+          <a:lnRef idx="2">
+            <a:schemeClr val="accent1">
+              <a:shade val="50000"/>
+            </a:schemeClr>
+          </a:lnRef>
+          <a:fillRef idx="1">
+            <a:schemeClr val="accent1"/>
+          </a:fillRef>
+          <a:effectRef idx="0">
+            <a:schemeClr val="accent1"/>
+          </a:effectRef>
+          <a:fontRef idx="minor">
+            <a:schemeClr val="lt1"/>
+          </a:fontRef>
+        </p:style>
+        <p:txBody>
+          <a:bodyPr rtlCol="0" anchor="ctr"/>
+          <a:lstStyle/>
+          <a:p>
+            <a:pPr algn="ctr"/>
+            <a:r>
+              <a:rPr lang="pt-BR" dirty="0"/>
+              <a:t>Exportar relatórios</a:t>
+            </a:r>
+          </a:p>
+        </p:txBody>
+      </p:sp>
+      <p:cxnSp>
+        <p:nvCxnSpPr>
+          <p:cNvPr id="12" name="Conector de Seta Reta 11">
+            <a:extLst>
+              <a:ext uri="{FF2B5EF4-FFF2-40B4-BE49-F238E27FC236}">
+                <a16:creationId xmlns:a16="http://schemas.microsoft.com/office/drawing/2014/main" id="{080518DD-974A-40D0-B51E-7DF3EB382817}"/>
+              </a:ext>
+            </a:extLst>
+          </p:cNvPr>
+          <p:cNvCxnSpPr>
+            <a:cxnSpLocks/>
+            <a:stCxn id="5" idx="3"/>
+            <a:endCxn id="7" idx="2"/>
+          </p:cNvCxnSpPr>
+          <p:nvPr/>
+        </p:nvCxnSpPr>
+        <p:spPr>
+          <a:xfrm flipV="1">
+            <a:off x="1224586" y="1578077"/>
+            <a:ext cx="2521504" cy="1386129"/>
+          </a:xfrm>
+          <a:prstGeom prst="straightConnector1">
+            <a:avLst/>
+          </a:prstGeom>
+          <a:ln>
+            <a:tailEnd type="triangle"/>
+          </a:ln>
+        </p:spPr>
+        <p:style>
+          <a:lnRef idx="1">
+            <a:schemeClr val="accent1"/>
+          </a:lnRef>
+          <a:fillRef idx="0">
+            <a:schemeClr val="accent1"/>
+          </a:fillRef>
+          <a:effectRef idx="0">
+            <a:schemeClr val="accent1"/>
+          </a:effectRef>
+          <a:fontRef idx="minor">
+            <a:schemeClr val="tx1"/>
+          </a:fontRef>
+        </p:style>
+      </p:cxnSp>
+      <p:cxnSp>
+        <p:nvCxnSpPr>
+          <p:cNvPr id="15" name="Conector de Seta Reta 14">
+            <a:extLst>
+              <a:ext uri="{FF2B5EF4-FFF2-40B4-BE49-F238E27FC236}">
+                <a16:creationId xmlns:a16="http://schemas.microsoft.com/office/drawing/2014/main" id="{4BF95137-3AC5-4A5F-A299-1E1E4A6DE901}"/>
+              </a:ext>
+            </a:extLst>
+          </p:cNvPr>
+          <p:cNvCxnSpPr>
+            <a:cxnSpLocks/>
+            <a:stCxn id="5" idx="3"/>
+            <a:endCxn id="8" idx="2"/>
+          </p:cNvCxnSpPr>
+          <p:nvPr/>
+        </p:nvCxnSpPr>
+        <p:spPr>
+          <a:xfrm flipV="1">
+            <a:off x="1224586" y="2772696"/>
+            <a:ext cx="2521504" cy="191510"/>
+          </a:xfrm>
+          <a:prstGeom prst="straightConnector1">
+            <a:avLst/>
+          </a:prstGeom>
+          <a:ln>
+            <a:tailEnd type="triangle"/>
+          </a:ln>
+        </p:spPr>
+        <p:style>
+          <a:lnRef idx="1">
+            <a:schemeClr val="accent1"/>
+          </a:lnRef>
+          <a:fillRef idx="0">
+            <a:schemeClr val="accent1"/>
+          </a:fillRef>
+          <a:effectRef idx="0">
+            <a:schemeClr val="accent1"/>
+          </a:effectRef>
+          <a:fontRef idx="minor">
+            <a:schemeClr val="tx1"/>
+          </a:fontRef>
+        </p:style>
+      </p:cxnSp>
+      <p:cxnSp>
+        <p:nvCxnSpPr>
+          <p:cNvPr id="16" name="Conector de Seta Reta 15">
+            <a:extLst>
+              <a:ext uri="{FF2B5EF4-FFF2-40B4-BE49-F238E27FC236}">
+                <a16:creationId xmlns:a16="http://schemas.microsoft.com/office/drawing/2014/main" id="{2C79497A-7210-4C13-9690-0555CD17F591}"/>
+              </a:ext>
+            </a:extLst>
+          </p:cNvPr>
+          <p:cNvCxnSpPr>
+            <a:cxnSpLocks/>
+            <a:stCxn id="5" idx="3"/>
+            <a:endCxn id="9" idx="2"/>
+          </p:cNvCxnSpPr>
+          <p:nvPr/>
+        </p:nvCxnSpPr>
+        <p:spPr>
+          <a:xfrm>
+            <a:off x="1224586" y="2964206"/>
+            <a:ext cx="2521504" cy="1003109"/>
+          </a:xfrm>
+          <a:prstGeom prst="straightConnector1">
+            <a:avLst/>
+          </a:prstGeom>
+          <a:ln>
+            <a:tailEnd type="triangle"/>
+          </a:ln>
+        </p:spPr>
+        <p:style>
+          <a:lnRef idx="1">
+            <a:schemeClr val="accent1"/>
+          </a:lnRef>
+          <a:fillRef idx="0">
+            <a:schemeClr val="accent1"/>
+          </a:fillRef>
+          <a:effectRef idx="0">
+            <a:schemeClr val="accent1"/>
+          </a:effectRef>
+          <a:fontRef idx="minor">
+            <a:schemeClr val="tx1"/>
+          </a:fontRef>
+        </p:style>
+      </p:cxnSp>
+      <p:cxnSp>
+        <p:nvCxnSpPr>
+          <p:cNvPr id="17" name="Conector de Seta Reta 16">
+            <a:extLst>
+              <a:ext uri="{FF2B5EF4-FFF2-40B4-BE49-F238E27FC236}">
+                <a16:creationId xmlns:a16="http://schemas.microsoft.com/office/drawing/2014/main" id="{82E33F8C-15B7-47BB-BAAF-8BD6C1262B66}"/>
+              </a:ext>
+            </a:extLst>
+          </p:cNvPr>
+          <p:cNvCxnSpPr>
+            <a:cxnSpLocks/>
+            <a:stCxn id="5" idx="3"/>
+            <a:endCxn id="10" idx="2"/>
+          </p:cNvCxnSpPr>
+          <p:nvPr/>
+        </p:nvCxnSpPr>
+        <p:spPr>
+          <a:xfrm>
+            <a:off x="1224586" y="2964206"/>
+            <a:ext cx="2560833" cy="2315717"/>
+          </a:xfrm>
+          <a:prstGeom prst="straightConnector1">
+            <a:avLst/>
+          </a:prstGeom>
+          <a:ln>
+            <a:tailEnd type="triangle"/>
+          </a:ln>
+        </p:spPr>
+        <p:style>
+          <a:lnRef idx="1">
+            <a:schemeClr val="accent1"/>
+          </a:lnRef>
+          <a:fillRef idx="0">
+            <a:schemeClr val="accent1"/>
+          </a:fillRef>
+          <a:effectRef idx="0">
+            <a:schemeClr val="accent1"/>
+          </a:effectRef>
+          <a:fontRef idx="minor">
+            <a:schemeClr val="tx1"/>
+          </a:fontRef>
+        </p:style>
+      </p:cxnSp>
+    </p:spTree>
+    <p:extLst>
+      <p:ext uri="{BB962C8B-B14F-4D97-AF65-F5344CB8AC3E}">
+        <p14:creationId xmlns:p14="http://schemas.microsoft.com/office/powerpoint/2010/main" val="1596273459"/>
       </p:ext>
     </p:extLst>
   </p:cSld>

</xml_diff>